<commit_message>
Added AE graphs and PP
</commit_message>
<xml_diff>
--- a/BC3/G/Bozza.pptx
+++ b/BC3/G/Bozza.pptx
@@ -2,7 +2,7 @@
 <file path=ppt/presentation.xml><?xml version="1.0" encoding="utf-8"?>
 <p:presentation xmlns:a="http://schemas.openxmlformats.org/drawingml/2006/main" xmlns:r="http://schemas.openxmlformats.org/officeDocument/2006/relationships" xmlns:p="http://schemas.openxmlformats.org/presentationml/2006/main" saveSubsetFonts="1">
   <p:sldMasterIdLst>
-    <p:sldMasterId id="2147483648" r:id="rId1"/>
+    <p:sldMasterId id="2147483696" r:id="rId1"/>
   </p:sldMasterIdLst>
   <p:sldIdLst>
     <p:sldId id="256" r:id="rId2"/>
@@ -16,15 +16,16 @@
     <p:sldId id="263" r:id="rId10"/>
     <p:sldId id="265" r:id="rId11"/>
     <p:sldId id="266" r:id="rId12"/>
-    <p:sldId id="267" r:id="rId13"/>
+    <p:sldId id="268" r:id="rId13"/>
+    <p:sldId id="267" r:id="rId14"/>
   </p:sldIdLst>
   <p:sldSz cx="12192000" cy="6858000"/>
   <p:notesSz cx="6858000" cy="9144000"/>
   <p:defaultTextStyle>
     <a:defPPr>
-      <a:defRPr lang="it-IT"/>
+      <a:defRPr lang="en-US"/>
     </a:defPPr>
-    <a:lvl1pPr marL="0" algn="l" defTabSz="914400" rtl="0" eaLnBrk="1" latinLnBrk="0" hangingPunct="1">
+    <a:lvl1pPr marL="0" algn="l" defTabSz="457200" rtl="0" eaLnBrk="1" latinLnBrk="0" hangingPunct="1">
       <a:defRPr sz="1800" kern="1200">
         <a:solidFill>
           <a:schemeClr val="tx1"/>
@@ -34,7 +35,7 @@
         <a:cs typeface="+mn-cs"/>
       </a:defRPr>
     </a:lvl1pPr>
-    <a:lvl2pPr marL="457200" algn="l" defTabSz="914400" rtl="0" eaLnBrk="1" latinLnBrk="0" hangingPunct="1">
+    <a:lvl2pPr marL="457200" algn="l" defTabSz="457200" rtl="0" eaLnBrk="1" latinLnBrk="0" hangingPunct="1">
       <a:defRPr sz="1800" kern="1200">
         <a:solidFill>
           <a:schemeClr val="tx1"/>
@@ -44,7 +45,7 @@
         <a:cs typeface="+mn-cs"/>
       </a:defRPr>
     </a:lvl2pPr>
-    <a:lvl3pPr marL="914400" algn="l" defTabSz="914400" rtl="0" eaLnBrk="1" latinLnBrk="0" hangingPunct="1">
+    <a:lvl3pPr marL="914400" algn="l" defTabSz="457200" rtl="0" eaLnBrk="1" latinLnBrk="0" hangingPunct="1">
       <a:defRPr sz="1800" kern="1200">
         <a:solidFill>
           <a:schemeClr val="tx1"/>
@@ -54,7 +55,7 @@
         <a:cs typeface="+mn-cs"/>
       </a:defRPr>
     </a:lvl3pPr>
-    <a:lvl4pPr marL="1371600" algn="l" defTabSz="914400" rtl="0" eaLnBrk="1" latinLnBrk="0" hangingPunct="1">
+    <a:lvl4pPr marL="1371600" algn="l" defTabSz="457200" rtl="0" eaLnBrk="1" latinLnBrk="0" hangingPunct="1">
       <a:defRPr sz="1800" kern="1200">
         <a:solidFill>
           <a:schemeClr val="tx1"/>
@@ -64,7 +65,7 @@
         <a:cs typeface="+mn-cs"/>
       </a:defRPr>
     </a:lvl4pPr>
-    <a:lvl5pPr marL="1828800" algn="l" defTabSz="914400" rtl="0" eaLnBrk="1" latinLnBrk="0" hangingPunct="1">
+    <a:lvl5pPr marL="1828800" algn="l" defTabSz="457200" rtl="0" eaLnBrk="1" latinLnBrk="0" hangingPunct="1">
       <a:defRPr sz="1800" kern="1200">
         <a:solidFill>
           <a:schemeClr val="tx1"/>
@@ -74,7 +75,7 @@
         <a:cs typeface="+mn-cs"/>
       </a:defRPr>
     </a:lvl5pPr>
-    <a:lvl6pPr marL="2286000" algn="l" defTabSz="914400" rtl="0" eaLnBrk="1" latinLnBrk="0" hangingPunct="1">
+    <a:lvl6pPr marL="2286000" algn="l" defTabSz="457200" rtl="0" eaLnBrk="1" latinLnBrk="0" hangingPunct="1">
       <a:defRPr sz="1800" kern="1200">
         <a:solidFill>
           <a:schemeClr val="tx1"/>
@@ -84,7 +85,7 @@
         <a:cs typeface="+mn-cs"/>
       </a:defRPr>
     </a:lvl6pPr>
-    <a:lvl7pPr marL="2743200" algn="l" defTabSz="914400" rtl="0" eaLnBrk="1" latinLnBrk="0" hangingPunct="1">
+    <a:lvl7pPr marL="2743200" algn="l" defTabSz="457200" rtl="0" eaLnBrk="1" latinLnBrk="0" hangingPunct="1">
       <a:defRPr sz="1800" kern="1200">
         <a:solidFill>
           <a:schemeClr val="tx1"/>
@@ -94,7 +95,7 @@
         <a:cs typeface="+mn-cs"/>
       </a:defRPr>
     </a:lvl7pPr>
-    <a:lvl8pPr marL="3200400" algn="l" defTabSz="914400" rtl="0" eaLnBrk="1" latinLnBrk="0" hangingPunct="1">
+    <a:lvl8pPr marL="3200400" algn="l" defTabSz="457200" rtl="0" eaLnBrk="1" latinLnBrk="0" hangingPunct="1">
       <a:defRPr sz="1800" kern="1200">
         <a:solidFill>
           <a:schemeClr val="tx1"/>
@@ -104,7 +105,7 @@
         <a:cs typeface="+mn-cs"/>
       </a:defRPr>
     </a:lvl8pPr>
-    <a:lvl9pPr marL="3657600" algn="l" defTabSz="914400" rtl="0" eaLnBrk="1" latinLnBrk="0" hangingPunct="1">
+    <a:lvl9pPr marL="3657600" algn="l" defTabSz="457200" rtl="0" eaLnBrk="1" latinLnBrk="0" hangingPunct="1">
       <a:defRPr sz="1800" kern="1200">
         <a:solidFill>
           <a:schemeClr val="tx1"/>
@@ -115,6 +116,22 @@
       </a:defRPr>
     </a:lvl9pPr>
   </p:defaultTextStyle>
+  <p:extLst>
+    <p:ext uri="{EFAFB233-063F-42B5-8137-9DF3F51BA10A}">
+      <p15:sldGuideLst xmlns:p15="http://schemas.microsoft.com/office/powerpoint/2012/main">
+        <p15:guide id="1" orient="horz" pos="2183" userDrawn="1">
+          <p15:clr>
+            <a:srgbClr val="A4A3A4"/>
+          </p15:clr>
+        </p15:guide>
+        <p15:guide id="2" pos="3840" userDrawn="1">
+          <p15:clr>
+            <a:srgbClr val="A4A3A4"/>
+          </p15:clr>
+        </p15:guide>
+      </p15:sldGuideLst>
+    </p:ext>
+  </p:extLst>
 </p:presentation>
 </file>
 
@@ -137,13 +154,7 @@
       </p:grpSpPr>
       <p:sp>
         <p:nvSpPr>
-          <p:cNvPr id="2" name="Titolo 1">
-            <a:extLst>
-              <a:ext uri="{FF2B5EF4-FFF2-40B4-BE49-F238E27FC236}">
-                <a16:creationId xmlns:a16="http://schemas.microsoft.com/office/drawing/2014/main" id="{9B621C99-9987-90B1-E688-C3CEF618F984}"/>
-              </a:ext>
-            </a:extLst>
-          </p:cNvPr>
+          <p:cNvPr id="2" name="Title 1"/>
           <p:cNvSpPr>
             <a:spLocks noGrp="1"/>
           </p:cNvSpPr>
@@ -169,18 +180,13 @@
               <a:rPr lang="it-IT"/>
               <a:t>Fare clic per modificare lo stile del titolo dello schema</a:t>
             </a:r>
-          </a:p>
-        </p:txBody>
-      </p:sp>
-      <p:sp>
-        <p:nvSpPr>
-          <p:cNvPr id="3" name="Sottotitolo 2">
-            <a:extLst>
-              <a:ext uri="{FF2B5EF4-FFF2-40B4-BE49-F238E27FC236}">
-                <a16:creationId xmlns:a16="http://schemas.microsoft.com/office/drawing/2014/main" id="{C460FAA6-0B4B-AB52-7175-92982933E177}"/>
-              </a:ext>
-            </a:extLst>
-          </p:cNvPr>
+            <a:endParaRPr lang="en-US" dirty="0"/>
+          </a:p>
+        </p:txBody>
+      </p:sp>
+      <p:sp>
+        <p:nvSpPr>
+          <p:cNvPr id="3" name="Subtitle 2"/>
           <p:cNvSpPr>
             <a:spLocks noGrp="1"/>
           </p:cNvSpPr>
@@ -239,18 +245,13 @@
               <a:rPr lang="it-IT"/>
               <a:t>Fare clic per modificare lo stile del sottotitolo dello schema</a:t>
             </a:r>
-          </a:p>
-        </p:txBody>
-      </p:sp>
-      <p:sp>
-        <p:nvSpPr>
-          <p:cNvPr id="4" name="Segnaposto data 3">
-            <a:extLst>
-              <a:ext uri="{FF2B5EF4-FFF2-40B4-BE49-F238E27FC236}">
-                <a16:creationId xmlns:a16="http://schemas.microsoft.com/office/drawing/2014/main" id="{8DB8F5AC-E8AB-E3B0-92F3-48F4CD4C27D7}"/>
-              </a:ext>
-            </a:extLst>
-          </p:cNvPr>
+            <a:endParaRPr lang="en-US" dirty="0"/>
+          </a:p>
+        </p:txBody>
+      </p:sp>
+      <p:sp>
+        <p:nvSpPr>
+          <p:cNvPr id="4" name="Date Placeholder 3"/>
           <p:cNvSpPr>
             <a:spLocks noGrp="1"/>
           </p:cNvSpPr>
@@ -265,7 +266,7 @@
           <a:p>
             <a:fld id="{1A270AA3-85FD-4336-B0B7-87033A430298}" type="datetimeFigureOut">
               <a:rPr lang="it-IT" smtClean="0"/>
-              <a:t>17/04/2023</a:t>
+              <a:t>18/04/2023</a:t>
             </a:fld>
             <a:endParaRPr lang="it-IT"/>
           </a:p>
@@ -273,13 +274,7 @@
       </p:sp>
       <p:sp>
         <p:nvSpPr>
-          <p:cNvPr id="5" name="Segnaposto piè di pagina 4">
-            <a:extLst>
-              <a:ext uri="{FF2B5EF4-FFF2-40B4-BE49-F238E27FC236}">
-                <a16:creationId xmlns:a16="http://schemas.microsoft.com/office/drawing/2014/main" id="{8E3AE2BC-0568-B982-42E5-DF0DBDEF0751}"/>
-              </a:ext>
-            </a:extLst>
-          </p:cNvPr>
+          <p:cNvPr id="5" name="Footer Placeholder 4"/>
           <p:cNvSpPr>
             <a:spLocks noGrp="1"/>
           </p:cNvSpPr>
@@ -298,13 +293,7 @@
       </p:sp>
       <p:sp>
         <p:nvSpPr>
-          <p:cNvPr id="6" name="Segnaposto numero diapositiva 5">
-            <a:extLst>
-              <a:ext uri="{FF2B5EF4-FFF2-40B4-BE49-F238E27FC236}">
-                <a16:creationId xmlns:a16="http://schemas.microsoft.com/office/drawing/2014/main" id="{08922372-5F51-F7AF-9002-4F0B9324DA8A}"/>
-              </a:ext>
-            </a:extLst>
-          </p:cNvPr>
+          <p:cNvPr id="6" name="Slide Number Placeholder 5"/>
           <p:cNvSpPr>
             <a:spLocks noGrp="1"/>
           </p:cNvSpPr>
@@ -328,7 +317,7 @@
     </p:spTree>
     <p:extLst>
       <p:ext uri="{BB962C8B-B14F-4D97-AF65-F5344CB8AC3E}">
-        <p14:creationId xmlns:p14="http://schemas.microsoft.com/office/powerpoint/2010/main" val="1286424608"/>
+        <p14:creationId xmlns:p14="http://schemas.microsoft.com/office/powerpoint/2010/main" val="247758086"/>
       </p:ext>
     </p:extLst>
   </p:cSld>
@@ -357,13 +346,7 @@
       </p:grpSpPr>
       <p:sp>
         <p:nvSpPr>
-          <p:cNvPr id="2" name="Titolo 1">
-            <a:extLst>
-              <a:ext uri="{FF2B5EF4-FFF2-40B4-BE49-F238E27FC236}">
-                <a16:creationId xmlns:a16="http://schemas.microsoft.com/office/drawing/2014/main" id="{B2C7074C-A25F-3C63-855E-84697FE18161}"/>
-              </a:ext>
-            </a:extLst>
-          </p:cNvPr>
+          <p:cNvPr id="2" name="Title 1"/>
           <p:cNvSpPr>
             <a:spLocks noGrp="1"/>
           </p:cNvSpPr>
@@ -380,18 +363,13 @@
               <a:rPr lang="it-IT"/>
               <a:t>Fare clic per modificare lo stile del titolo dello schema</a:t>
             </a:r>
-          </a:p>
-        </p:txBody>
-      </p:sp>
-      <p:sp>
-        <p:nvSpPr>
-          <p:cNvPr id="3" name="Segnaposto testo verticale 2">
-            <a:extLst>
-              <a:ext uri="{FF2B5EF4-FFF2-40B4-BE49-F238E27FC236}">
-                <a16:creationId xmlns:a16="http://schemas.microsoft.com/office/drawing/2014/main" id="{445B89CA-B03B-A02C-ABC2-72E677C45AB5}"/>
-              </a:ext>
-            </a:extLst>
-          </p:cNvPr>
+            <a:endParaRPr lang="en-US" dirty="0"/>
+          </a:p>
+        </p:txBody>
+      </p:sp>
+      <p:sp>
+        <p:nvSpPr>
+          <p:cNvPr id="3" name="Vertical Text Placeholder 2"/>
           <p:cNvSpPr>
             <a:spLocks noGrp="1"/>
           </p:cNvSpPr>
@@ -437,18 +415,13 @@
               <a:rPr lang="it-IT"/>
               <a:t>Quinto livello</a:t>
             </a:r>
-          </a:p>
-        </p:txBody>
-      </p:sp>
-      <p:sp>
-        <p:nvSpPr>
-          <p:cNvPr id="4" name="Segnaposto data 3">
-            <a:extLst>
-              <a:ext uri="{FF2B5EF4-FFF2-40B4-BE49-F238E27FC236}">
-                <a16:creationId xmlns:a16="http://schemas.microsoft.com/office/drawing/2014/main" id="{5EEF4BCF-9D69-38A8-EA5C-8C67B9537024}"/>
-              </a:ext>
-            </a:extLst>
-          </p:cNvPr>
+            <a:endParaRPr lang="en-US" dirty="0"/>
+          </a:p>
+        </p:txBody>
+      </p:sp>
+      <p:sp>
+        <p:nvSpPr>
+          <p:cNvPr id="4" name="Date Placeholder 3"/>
           <p:cNvSpPr>
             <a:spLocks noGrp="1"/>
           </p:cNvSpPr>
@@ -463,7 +436,7 @@
           <a:p>
             <a:fld id="{1A270AA3-85FD-4336-B0B7-87033A430298}" type="datetimeFigureOut">
               <a:rPr lang="it-IT" smtClean="0"/>
-              <a:t>17/04/2023</a:t>
+              <a:t>18/04/2023</a:t>
             </a:fld>
             <a:endParaRPr lang="it-IT"/>
           </a:p>
@@ -471,13 +444,7 @@
       </p:sp>
       <p:sp>
         <p:nvSpPr>
-          <p:cNvPr id="5" name="Segnaposto piè di pagina 4">
-            <a:extLst>
-              <a:ext uri="{FF2B5EF4-FFF2-40B4-BE49-F238E27FC236}">
-                <a16:creationId xmlns:a16="http://schemas.microsoft.com/office/drawing/2014/main" id="{6626BED8-D2F2-C577-35AE-4426F3F82F13}"/>
-              </a:ext>
-            </a:extLst>
-          </p:cNvPr>
+          <p:cNvPr id="5" name="Footer Placeholder 4"/>
           <p:cNvSpPr>
             <a:spLocks noGrp="1"/>
           </p:cNvSpPr>
@@ -496,13 +463,7 @@
       </p:sp>
       <p:sp>
         <p:nvSpPr>
-          <p:cNvPr id="6" name="Segnaposto numero diapositiva 5">
-            <a:extLst>
-              <a:ext uri="{FF2B5EF4-FFF2-40B4-BE49-F238E27FC236}">
-                <a16:creationId xmlns:a16="http://schemas.microsoft.com/office/drawing/2014/main" id="{E97FD342-DAC5-F633-6D0E-E9A5D16A7540}"/>
-              </a:ext>
-            </a:extLst>
-          </p:cNvPr>
+          <p:cNvPr id="6" name="Slide Number Placeholder 5"/>
           <p:cNvSpPr>
             <a:spLocks noGrp="1"/>
           </p:cNvSpPr>
@@ -526,7 +487,7 @@
     </p:spTree>
     <p:extLst>
       <p:ext uri="{BB962C8B-B14F-4D97-AF65-F5344CB8AC3E}">
-        <p14:creationId xmlns:p14="http://schemas.microsoft.com/office/powerpoint/2010/main" val="1151787533"/>
+        <p14:creationId xmlns:p14="http://schemas.microsoft.com/office/powerpoint/2010/main" val="886629220"/>
       </p:ext>
     </p:extLst>
   </p:cSld>
@@ -555,13 +516,7 @@
       </p:grpSpPr>
       <p:sp>
         <p:nvSpPr>
-          <p:cNvPr id="2" name="Titolo verticale 1">
-            <a:extLst>
-              <a:ext uri="{FF2B5EF4-FFF2-40B4-BE49-F238E27FC236}">
-                <a16:creationId xmlns:a16="http://schemas.microsoft.com/office/drawing/2014/main" id="{B3DA5DAA-B954-DC76-7D63-ABEFDCDC19C3}"/>
-              </a:ext>
-            </a:extLst>
-          </p:cNvPr>
+          <p:cNvPr id="2" name="Vertical Title 1"/>
           <p:cNvSpPr>
             <a:spLocks noGrp="1"/>
           </p:cNvSpPr>
@@ -583,18 +538,13 @@
               <a:rPr lang="it-IT"/>
               <a:t>Fare clic per modificare lo stile del titolo dello schema</a:t>
             </a:r>
-          </a:p>
-        </p:txBody>
-      </p:sp>
-      <p:sp>
-        <p:nvSpPr>
-          <p:cNvPr id="3" name="Segnaposto testo verticale 2">
-            <a:extLst>
-              <a:ext uri="{FF2B5EF4-FFF2-40B4-BE49-F238E27FC236}">
-                <a16:creationId xmlns:a16="http://schemas.microsoft.com/office/drawing/2014/main" id="{43ABF16E-88EA-CC6E-E197-C14FF8EAE11C}"/>
-              </a:ext>
-            </a:extLst>
-          </p:cNvPr>
+            <a:endParaRPr lang="en-US" dirty="0"/>
+          </a:p>
+        </p:txBody>
+      </p:sp>
+      <p:sp>
+        <p:nvSpPr>
+          <p:cNvPr id="3" name="Vertical Text Placeholder 2"/>
           <p:cNvSpPr>
             <a:spLocks noGrp="1"/>
           </p:cNvSpPr>
@@ -645,18 +595,13 @@
               <a:rPr lang="it-IT"/>
               <a:t>Quinto livello</a:t>
             </a:r>
-          </a:p>
-        </p:txBody>
-      </p:sp>
-      <p:sp>
-        <p:nvSpPr>
-          <p:cNvPr id="4" name="Segnaposto data 3">
-            <a:extLst>
-              <a:ext uri="{FF2B5EF4-FFF2-40B4-BE49-F238E27FC236}">
-                <a16:creationId xmlns:a16="http://schemas.microsoft.com/office/drawing/2014/main" id="{A265E86C-CC91-4ABF-3829-3E563D5DEF8A}"/>
-              </a:ext>
-            </a:extLst>
-          </p:cNvPr>
+            <a:endParaRPr lang="en-US" dirty="0"/>
+          </a:p>
+        </p:txBody>
+      </p:sp>
+      <p:sp>
+        <p:nvSpPr>
+          <p:cNvPr id="4" name="Date Placeholder 3"/>
           <p:cNvSpPr>
             <a:spLocks noGrp="1"/>
           </p:cNvSpPr>
@@ -671,7 +616,7 @@
           <a:p>
             <a:fld id="{1A270AA3-85FD-4336-B0B7-87033A430298}" type="datetimeFigureOut">
               <a:rPr lang="it-IT" smtClean="0"/>
-              <a:t>17/04/2023</a:t>
+              <a:t>18/04/2023</a:t>
             </a:fld>
             <a:endParaRPr lang="it-IT"/>
           </a:p>
@@ -679,13 +624,7 @@
       </p:sp>
       <p:sp>
         <p:nvSpPr>
-          <p:cNvPr id="5" name="Segnaposto piè di pagina 4">
-            <a:extLst>
-              <a:ext uri="{FF2B5EF4-FFF2-40B4-BE49-F238E27FC236}">
-                <a16:creationId xmlns:a16="http://schemas.microsoft.com/office/drawing/2014/main" id="{0BB734CE-5F5B-6E63-FA43-5BA5F132449F}"/>
-              </a:ext>
-            </a:extLst>
-          </p:cNvPr>
+          <p:cNvPr id="5" name="Footer Placeholder 4"/>
           <p:cNvSpPr>
             <a:spLocks noGrp="1"/>
           </p:cNvSpPr>
@@ -704,13 +643,7 @@
       </p:sp>
       <p:sp>
         <p:nvSpPr>
-          <p:cNvPr id="6" name="Segnaposto numero diapositiva 5">
-            <a:extLst>
-              <a:ext uri="{FF2B5EF4-FFF2-40B4-BE49-F238E27FC236}">
-                <a16:creationId xmlns:a16="http://schemas.microsoft.com/office/drawing/2014/main" id="{BB075F97-567A-5F54-AC7B-37C1DFA786BB}"/>
-              </a:ext>
-            </a:extLst>
-          </p:cNvPr>
+          <p:cNvPr id="6" name="Slide Number Placeholder 5"/>
           <p:cNvSpPr>
             <a:spLocks noGrp="1"/>
           </p:cNvSpPr>
@@ -734,7 +667,7 @@
     </p:spTree>
     <p:extLst>
       <p:ext uri="{BB962C8B-B14F-4D97-AF65-F5344CB8AC3E}">
-        <p14:creationId xmlns:p14="http://schemas.microsoft.com/office/powerpoint/2010/main" val="573376137"/>
+        <p14:creationId xmlns:p14="http://schemas.microsoft.com/office/powerpoint/2010/main" val="3753554813"/>
       </p:ext>
     </p:extLst>
   </p:cSld>
@@ -763,13 +696,7 @@
       </p:grpSpPr>
       <p:sp>
         <p:nvSpPr>
-          <p:cNvPr id="2" name="Titolo 1">
-            <a:extLst>
-              <a:ext uri="{FF2B5EF4-FFF2-40B4-BE49-F238E27FC236}">
-                <a16:creationId xmlns:a16="http://schemas.microsoft.com/office/drawing/2014/main" id="{5EB00E46-C276-CD92-8ED6-3E03162BF256}"/>
-              </a:ext>
-            </a:extLst>
-          </p:cNvPr>
+          <p:cNvPr id="2" name="Title 1"/>
           <p:cNvSpPr>
             <a:spLocks noGrp="1"/>
           </p:cNvSpPr>
@@ -786,18 +713,13 @@
               <a:rPr lang="it-IT"/>
               <a:t>Fare clic per modificare lo stile del titolo dello schema</a:t>
             </a:r>
-          </a:p>
-        </p:txBody>
-      </p:sp>
-      <p:sp>
-        <p:nvSpPr>
-          <p:cNvPr id="3" name="Segnaposto contenuto 2">
-            <a:extLst>
-              <a:ext uri="{FF2B5EF4-FFF2-40B4-BE49-F238E27FC236}">
-                <a16:creationId xmlns:a16="http://schemas.microsoft.com/office/drawing/2014/main" id="{C8AB66E3-31CD-318D-43A1-C3270D6F2D52}"/>
-              </a:ext>
-            </a:extLst>
-          </p:cNvPr>
+            <a:endParaRPr lang="en-US" dirty="0"/>
+          </a:p>
+        </p:txBody>
+      </p:sp>
+      <p:sp>
+        <p:nvSpPr>
+          <p:cNvPr id="3" name="Content Placeholder 2"/>
           <p:cNvSpPr>
             <a:spLocks noGrp="1"/>
           </p:cNvSpPr>
@@ -843,18 +765,13 @@
               <a:rPr lang="it-IT"/>
               <a:t>Quinto livello</a:t>
             </a:r>
-          </a:p>
-        </p:txBody>
-      </p:sp>
-      <p:sp>
-        <p:nvSpPr>
-          <p:cNvPr id="4" name="Segnaposto data 3">
-            <a:extLst>
-              <a:ext uri="{FF2B5EF4-FFF2-40B4-BE49-F238E27FC236}">
-                <a16:creationId xmlns:a16="http://schemas.microsoft.com/office/drawing/2014/main" id="{E4C3C7FC-70E7-A8E7-0AC9-1EA8F101F328}"/>
-              </a:ext>
-            </a:extLst>
-          </p:cNvPr>
+            <a:endParaRPr lang="en-US" dirty="0"/>
+          </a:p>
+        </p:txBody>
+      </p:sp>
+      <p:sp>
+        <p:nvSpPr>
+          <p:cNvPr id="4" name="Date Placeholder 3"/>
           <p:cNvSpPr>
             <a:spLocks noGrp="1"/>
           </p:cNvSpPr>
@@ -869,7 +786,7 @@
           <a:p>
             <a:fld id="{1A270AA3-85FD-4336-B0B7-87033A430298}" type="datetimeFigureOut">
               <a:rPr lang="it-IT" smtClean="0"/>
-              <a:t>17/04/2023</a:t>
+              <a:t>18/04/2023</a:t>
             </a:fld>
             <a:endParaRPr lang="it-IT"/>
           </a:p>
@@ -877,13 +794,7 @@
       </p:sp>
       <p:sp>
         <p:nvSpPr>
-          <p:cNvPr id="5" name="Segnaposto piè di pagina 4">
-            <a:extLst>
-              <a:ext uri="{FF2B5EF4-FFF2-40B4-BE49-F238E27FC236}">
-                <a16:creationId xmlns:a16="http://schemas.microsoft.com/office/drawing/2014/main" id="{51996E1C-4558-3D1F-0D63-36E1D79D683D}"/>
-              </a:ext>
-            </a:extLst>
-          </p:cNvPr>
+          <p:cNvPr id="5" name="Footer Placeholder 4"/>
           <p:cNvSpPr>
             <a:spLocks noGrp="1"/>
           </p:cNvSpPr>
@@ -902,13 +813,7 @@
       </p:sp>
       <p:sp>
         <p:nvSpPr>
-          <p:cNvPr id="6" name="Segnaposto numero diapositiva 5">
-            <a:extLst>
-              <a:ext uri="{FF2B5EF4-FFF2-40B4-BE49-F238E27FC236}">
-                <a16:creationId xmlns:a16="http://schemas.microsoft.com/office/drawing/2014/main" id="{1ACA15AD-518B-FE0A-C75B-7CAB8E67CD43}"/>
-              </a:ext>
-            </a:extLst>
-          </p:cNvPr>
+          <p:cNvPr id="6" name="Slide Number Placeholder 5"/>
           <p:cNvSpPr>
             <a:spLocks noGrp="1"/>
           </p:cNvSpPr>
@@ -932,7 +837,7 @@
     </p:spTree>
     <p:extLst>
       <p:ext uri="{BB962C8B-B14F-4D97-AF65-F5344CB8AC3E}">
-        <p14:creationId xmlns:p14="http://schemas.microsoft.com/office/powerpoint/2010/main" val="633153519"/>
+        <p14:creationId xmlns:p14="http://schemas.microsoft.com/office/powerpoint/2010/main" val="713618572"/>
       </p:ext>
     </p:extLst>
   </p:cSld>
@@ -961,13 +866,7 @@
       </p:grpSpPr>
       <p:sp>
         <p:nvSpPr>
-          <p:cNvPr id="2" name="Titolo 1">
-            <a:extLst>
-              <a:ext uri="{FF2B5EF4-FFF2-40B4-BE49-F238E27FC236}">
-                <a16:creationId xmlns:a16="http://schemas.microsoft.com/office/drawing/2014/main" id="{485EDD04-859E-56E9-0BA9-671AAC9EA726}"/>
-              </a:ext>
-            </a:extLst>
-          </p:cNvPr>
+          <p:cNvPr id="2" name="Title 1"/>
           <p:cNvSpPr>
             <a:spLocks noGrp="1"/>
           </p:cNvSpPr>
@@ -993,18 +892,13 @@
               <a:rPr lang="it-IT"/>
               <a:t>Fare clic per modificare lo stile del titolo dello schema</a:t>
             </a:r>
-          </a:p>
-        </p:txBody>
-      </p:sp>
-      <p:sp>
-        <p:nvSpPr>
-          <p:cNvPr id="3" name="Segnaposto testo 2">
-            <a:extLst>
-              <a:ext uri="{FF2B5EF4-FFF2-40B4-BE49-F238E27FC236}">
-                <a16:creationId xmlns:a16="http://schemas.microsoft.com/office/drawing/2014/main" id="{CF13278A-FA8E-C7E5-74D7-A8804C35C4E6}"/>
-              </a:ext>
-            </a:extLst>
-          </p:cNvPr>
+            <a:endParaRPr lang="en-US" dirty="0"/>
+          </a:p>
+        </p:txBody>
+      </p:sp>
+      <p:sp>
+        <p:nvSpPr>
+          <p:cNvPr id="3" name="Text Placeholder 2"/>
           <p:cNvSpPr>
             <a:spLocks noGrp="1"/>
           </p:cNvSpPr>
@@ -1123,13 +1017,7 @@
       </p:sp>
       <p:sp>
         <p:nvSpPr>
-          <p:cNvPr id="4" name="Segnaposto data 3">
-            <a:extLst>
-              <a:ext uri="{FF2B5EF4-FFF2-40B4-BE49-F238E27FC236}">
-                <a16:creationId xmlns:a16="http://schemas.microsoft.com/office/drawing/2014/main" id="{80825F19-6C56-83B2-F721-D070274DCA63}"/>
-              </a:ext>
-            </a:extLst>
-          </p:cNvPr>
+          <p:cNvPr id="4" name="Date Placeholder 3"/>
           <p:cNvSpPr>
             <a:spLocks noGrp="1"/>
           </p:cNvSpPr>
@@ -1144,7 +1032,7 @@
           <a:p>
             <a:fld id="{1A270AA3-85FD-4336-B0B7-87033A430298}" type="datetimeFigureOut">
               <a:rPr lang="it-IT" smtClean="0"/>
-              <a:t>17/04/2023</a:t>
+              <a:t>18/04/2023</a:t>
             </a:fld>
             <a:endParaRPr lang="it-IT"/>
           </a:p>
@@ -1152,13 +1040,7 @@
       </p:sp>
       <p:sp>
         <p:nvSpPr>
-          <p:cNvPr id="5" name="Segnaposto piè di pagina 4">
-            <a:extLst>
-              <a:ext uri="{FF2B5EF4-FFF2-40B4-BE49-F238E27FC236}">
-                <a16:creationId xmlns:a16="http://schemas.microsoft.com/office/drawing/2014/main" id="{A726AA02-1719-7F08-B7E5-DA096059E3AD}"/>
-              </a:ext>
-            </a:extLst>
-          </p:cNvPr>
+          <p:cNvPr id="5" name="Footer Placeholder 4"/>
           <p:cNvSpPr>
             <a:spLocks noGrp="1"/>
           </p:cNvSpPr>
@@ -1177,13 +1059,7 @@
       </p:sp>
       <p:sp>
         <p:nvSpPr>
-          <p:cNvPr id="6" name="Segnaposto numero diapositiva 5">
-            <a:extLst>
-              <a:ext uri="{FF2B5EF4-FFF2-40B4-BE49-F238E27FC236}">
-                <a16:creationId xmlns:a16="http://schemas.microsoft.com/office/drawing/2014/main" id="{DE7D6771-6EBD-6319-6BF0-01083F70A1EB}"/>
-              </a:ext>
-            </a:extLst>
-          </p:cNvPr>
+          <p:cNvPr id="6" name="Slide Number Placeholder 5"/>
           <p:cNvSpPr>
             <a:spLocks noGrp="1"/>
           </p:cNvSpPr>
@@ -1207,7 +1083,7 @@
     </p:spTree>
     <p:extLst>
       <p:ext uri="{BB962C8B-B14F-4D97-AF65-F5344CB8AC3E}">
-        <p14:creationId xmlns:p14="http://schemas.microsoft.com/office/powerpoint/2010/main" val="1202476103"/>
+        <p14:creationId xmlns:p14="http://schemas.microsoft.com/office/powerpoint/2010/main" val="3877966923"/>
       </p:ext>
     </p:extLst>
   </p:cSld>
@@ -1236,13 +1112,7 @@
       </p:grpSpPr>
       <p:sp>
         <p:nvSpPr>
-          <p:cNvPr id="2" name="Titolo 1">
-            <a:extLst>
-              <a:ext uri="{FF2B5EF4-FFF2-40B4-BE49-F238E27FC236}">
-                <a16:creationId xmlns:a16="http://schemas.microsoft.com/office/drawing/2014/main" id="{EE9D088C-6768-0AE9-1992-FA066A3763D7}"/>
-              </a:ext>
-            </a:extLst>
-          </p:cNvPr>
+          <p:cNvPr id="2" name="Title 1"/>
           <p:cNvSpPr>
             <a:spLocks noGrp="1"/>
           </p:cNvSpPr>
@@ -1259,18 +1129,13 @@
               <a:rPr lang="it-IT"/>
               <a:t>Fare clic per modificare lo stile del titolo dello schema</a:t>
             </a:r>
-          </a:p>
-        </p:txBody>
-      </p:sp>
-      <p:sp>
-        <p:nvSpPr>
-          <p:cNvPr id="3" name="Segnaposto contenuto 2">
-            <a:extLst>
-              <a:ext uri="{FF2B5EF4-FFF2-40B4-BE49-F238E27FC236}">
-                <a16:creationId xmlns:a16="http://schemas.microsoft.com/office/drawing/2014/main" id="{664468F9-8ECE-740D-8C3C-BCA12841BD23}"/>
-              </a:ext>
-            </a:extLst>
-          </p:cNvPr>
+            <a:endParaRPr lang="en-US" dirty="0"/>
+          </a:p>
+        </p:txBody>
+      </p:sp>
+      <p:sp>
+        <p:nvSpPr>
+          <p:cNvPr id="3" name="Content Placeholder 2"/>
           <p:cNvSpPr>
             <a:spLocks noGrp="1"/>
           </p:cNvSpPr>
@@ -1321,18 +1186,13 @@
               <a:rPr lang="it-IT"/>
               <a:t>Quinto livello</a:t>
             </a:r>
-          </a:p>
-        </p:txBody>
-      </p:sp>
-      <p:sp>
-        <p:nvSpPr>
-          <p:cNvPr id="4" name="Segnaposto contenuto 3">
-            <a:extLst>
-              <a:ext uri="{FF2B5EF4-FFF2-40B4-BE49-F238E27FC236}">
-                <a16:creationId xmlns:a16="http://schemas.microsoft.com/office/drawing/2014/main" id="{1E7D76C9-E0B9-356E-1B44-47BB729DD558}"/>
-              </a:ext>
-            </a:extLst>
-          </p:cNvPr>
+            <a:endParaRPr lang="en-US" dirty="0"/>
+          </a:p>
+        </p:txBody>
+      </p:sp>
+      <p:sp>
+        <p:nvSpPr>
+          <p:cNvPr id="4" name="Content Placeholder 3"/>
           <p:cNvSpPr>
             <a:spLocks noGrp="1"/>
           </p:cNvSpPr>
@@ -1383,18 +1243,13 @@
               <a:rPr lang="it-IT"/>
               <a:t>Quinto livello</a:t>
             </a:r>
-          </a:p>
-        </p:txBody>
-      </p:sp>
-      <p:sp>
-        <p:nvSpPr>
-          <p:cNvPr id="5" name="Segnaposto data 4">
-            <a:extLst>
-              <a:ext uri="{FF2B5EF4-FFF2-40B4-BE49-F238E27FC236}">
-                <a16:creationId xmlns:a16="http://schemas.microsoft.com/office/drawing/2014/main" id="{08FA66C6-2F09-9650-FEE3-105A4152A429}"/>
-              </a:ext>
-            </a:extLst>
-          </p:cNvPr>
+            <a:endParaRPr lang="en-US" dirty="0"/>
+          </a:p>
+        </p:txBody>
+      </p:sp>
+      <p:sp>
+        <p:nvSpPr>
+          <p:cNvPr id="5" name="Date Placeholder 4"/>
           <p:cNvSpPr>
             <a:spLocks noGrp="1"/>
           </p:cNvSpPr>
@@ -1409,7 +1264,7 @@
           <a:p>
             <a:fld id="{1A270AA3-85FD-4336-B0B7-87033A430298}" type="datetimeFigureOut">
               <a:rPr lang="it-IT" smtClean="0"/>
-              <a:t>17/04/2023</a:t>
+              <a:t>18/04/2023</a:t>
             </a:fld>
             <a:endParaRPr lang="it-IT"/>
           </a:p>
@@ -1417,13 +1272,7 @@
       </p:sp>
       <p:sp>
         <p:nvSpPr>
-          <p:cNvPr id="6" name="Segnaposto piè di pagina 5">
-            <a:extLst>
-              <a:ext uri="{FF2B5EF4-FFF2-40B4-BE49-F238E27FC236}">
-                <a16:creationId xmlns:a16="http://schemas.microsoft.com/office/drawing/2014/main" id="{E2503CB7-CF9E-3DE0-73DF-C7DDD858758B}"/>
-              </a:ext>
-            </a:extLst>
-          </p:cNvPr>
+          <p:cNvPr id="6" name="Footer Placeholder 5"/>
           <p:cNvSpPr>
             <a:spLocks noGrp="1"/>
           </p:cNvSpPr>
@@ -1442,13 +1291,7 @@
       </p:sp>
       <p:sp>
         <p:nvSpPr>
-          <p:cNvPr id="7" name="Segnaposto numero diapositiva 6">
-            <a:extLst>
-              <a:ext uri="{FF2B5EF4-FFF2-40B4-BE49-F238E27FC236}">
-                <a16:creationId xmlns:a16="http://schemas.microsoft.com/office/drawing/2014/main" id="{8338207F-106B-BB01-0C19-629D3674C781}"/>
-              </a:ext>
-            </a:extLst>
-          </p:cNvPr>
+          <p:cNvPr id="7" name="Slide Number Placeholder 6"/>
           <p:cNvSpPr>
             <a:spLocks noGrp="1"/>
           </p:cNvSpPr>
@@ -1472,7 +1315,7 @@
     </p:spTree>
     <p:extLst>
       <p:ext uri="{BB962C8B-B14F-4D97-AF65-F5344CB8AC3E}">
-        <p14:creationId xmlns:p14="http://schemas.microsoft.com/office/powerpoint/2010/main" val="229650795"/>
+        <p14:creationId xmlns:p14="http://schemas.microsoft.com/office/powerpoint/2010/main" val="3831343288"/>
       </p:ext>
     </p:extLst>
   </p:cSld>
@@ -1501,13 +1344,7 @@
       </p:grpSpPr>
       <p:sp>
         <p:nvSpPr>
-          <p:cNvPr id="2" name="Titolo 1">
-            <a:extLst>
-              <a:ext uri="{FF2B5EF4-FFF2-40B4-BE49-F238E27FC236}">
-                <a16:creationId xmlns:a16="http://schemas.microsoft.com/office/drawing/2014/main" id="{E96C9E40-C54C-DFF6-F344-DF4FD1CB338F}"/>
-              </a:ext>
-            </a:extLst>
-          </p:cNvPr>
+          <p:cNvPr id="2" name="Title 1"/>
           <p:cNvSpPr>
             <a:spLocks noGrp="1"/>
           </p:cNvSpPr>
@@ -1529,18 +1366,13 @@
               <a:rPr lang="it-IT"/>
               <a:t>Fare clic per modificare lo stile del titolo dello schema</a:t>
             </a:r>
-          </a:p>
-        </p:txBody>
-      </p:sp>
-      <p:sp>
-        <p:nvSpPr>
-          <p:cNvPr id="3" name="Segnaposto testo 2">
-            <a:extLst>
-              <a:ext uri="{FF2B5EF4-FFF2-40B4-BE49-F238E27FC236}">
-                <a16:creationId xmlns:a16="http://schemas.microsoft.com/office/drawing/2014/main" id="{EF7CA3FC-6037-09A8-694F-AF2BF6A0493B}"/>
-              </a:ext>
-            </a:extLst>
-          </p:cNvPr>
+            <a:endParaRPr lang="en-US" dirty="0"/>
+          </a:p>
+        </p:txBody>
+      </p:sp>
+      <p:sp>
+        <p:nvSpPr>
+          <p:cNvPr id="3" name="Text Placeholder 2"/>
           <p:cNvSpPr>
             <a:spLocks noGrp="1"/>
           </p:cNvSpPr>
@@ -1605,13 +1437,7 @@
       </p:sp>
       <p:sp>
         <p:nvSpPr>
-          <p:cNvPr id="4" name="Segnaposto contenuto 3">
-            <a:extLst>
-              <a:ext uri="{FF2B5EF4-FFF2-40B4-BE49-F238E27FC236}">
-                <a16:creationId xmlns:a16="http://schemas.microsoft.com/office/drawing/2014/main" id="{D5426E27-97F1-C608-A9EF-D254AEF64BC1}"/>
-              </a:ext>
-            </a:extLst>
-          </p:cNvPr>
+          <p:cNvPr id="4" name="Content Placeholder 3"/>
           <p:cNvSpPr>
             <a:spLocks noGrp="1"/>
           </p:cNvSpPr>
@@ -1662,18 +1488,13 @@
               <a:rPr lang="it-IT"/>
               <a:t>Quinto livello</a:t>
             </a:r>
-          </a:p>
-        </p:txBody>
-      </p:sp>
-      <p:sp>
-        <p:nvSpPr>
-          <p:cNvPr id="5" name="Segnaposto testo 4">
-            <a:extLst>
-              <a:ext uri="{FF2B5EF4-FFF2-40B4-BE49-F238E27FC236}">
-                <a16:creationId xmlns:a16="http://schemas.microsoft.com/office/drawing/2014/main" id="{369445C1-25B2-38AE-93B3-ECF48A51CC43}"/>
-              </a:ext>
-            </a:extLst>
-          </p:cNvPr>
+            <a:endParaRPr lang="en-US" dirty="0"/>
+          </a:p>
+        </p:txBody>
+      </p:sp>
+      <p:sp>
+        <p:nvSpPr>
+          <p:cNvPr id="5" name="Text Placeholder 4"/>
           <p:cNvSpPr>
             <a:spLocks noGrp="1"/>
           </p:cNvSpPr>
@@ -1738,13 +1559,7 @@
       </p:sp>
       <p:sp>
         <p:nvSpPr>
-          <p:cNvPr id="6" name="Segnaposto contenuto 5">
-            <a:extLst>
-              <a:ext uri="{FF2B5EF4-FFF2-40B4-BE49-F238E27FC236}">
-                <a16:creationId xmlns:a16="http://schemas.microsoft.com/office/drawing/2014/main" id="{7365E28F-23F4-1F90-B582-BC20594B991B}"/>
-              </a:ext>
-            </a:extLst>
-          </p:cNvPr>
+          <p:cNvPr id="6" name="Content Placeholder 5"/>
           <p:cNvSpPr>
             <a:spLocks noGrp="1"/>
           </p:cNvSpPr>
@@ -1795,18 +1610,13 @@
               <a:rPr lang="it-IT"/>
               <a:t>Quinto livello</a:t>
             </a:r>
-          </a:p>
-        </p:txBody>
-      </p:sp>
-      <p:sp>
-        <p:nvSpPr>
-          <p:cNvPr id="7" name="Segnaposto data 6">
-            <a:extLst>
-              <a:ext uri="{FF2B5EF4-FFF2-40B4-BE49-F238E27FC236}">
-                <a16:creationId xmlns:a16="http://schemas.microsoft.com/office/drawing/2014/main" id="{F1A6B12A-CB17-EB97-5E80-6CB2BC465D3E}"/>
-              </a:ext>
-            </a:extLst>
-          </p:cNvPr>
+            <a:endParaRPr lang="en-US" dirty="0"/>
+          </a:p>
+        </p:txBody>
+      </p:sp>
+      <p:sp>
+        <p:nvSpPr>
+          <p:cNvPr id="7" name="Date Placeholder 6"/>
           <p:cNvSpPr>
             <a:spLocks noGrp="1"/>
           </p:cNvSpPr>
@@ -1821,7 +1631,7 @@
           <a:p>
             <a:fld id="{1A270AA3-85FD-4336-B0B7-87033A430298}" type="datetimeFigureOut">
               <a:rPr lang="it-IT" smtClean="0"/>
-              <a:t>17/04/2023</a:t>
+              <a:t>18/04/2023</a:t>
             </a:fld>
             <a:endParaRPr lang="it-IT"/>
           </a:p>
@@ -1829,13 +1639,7 @@
       </p:sp>
       <p:sp>
         <p:nvSpPr>
-          <p:cNvPr id="8" name="Segnaposto piè di pagina 7">
-            <a:extLst>
-              <a:ext uri="{FF2B5EF4-FFF2-40B4-BE49-F238E27FC236}">
-                <a16:creationId xmlns:a16="http://schemas.microsoft.com/office/drawing/2014/main" id="{A28F5F29-558E-1B49-C29A-BAC939026A36}"/>
-              </a:ext>
-            </a:extLst>
-          </p:cNvPr>
+          <p:cNvPr id="8" name="Footer Placeholder 7"/>
           <p:cNvSpPr>
             <a:spLocks noGrp="1"/>
           </p:cNvSpPr>
@@ -1854,13 +1658,7 @@
       </p:sp>
       <p:sp>
         <p:nvSpPr>
-          <p:cNvPr id="9" name="Segnaposto numero diapositiva 8">
-            <a:extLst>
-              <a:ext uri="{FF2B5EF4-FFF2-40B4-BE49-F238E27FC236}">
-                <a16:creationId xmlns:a16="http://schemas.microsoft.com/office/drawing/2014/main" id="{4F686225-8DB1-2D5B-5FC2-E738B973BA36}"/>
-              </a:ext>
-            </a:extLst>
-          </p:cNvPr>
+          <p:cNvPr id="9" name="Slide Number Placeholder 8"/>
           <p:cNvSpPr>
             <a:spLocks noGrp="1"/>
           </p:cNvSpPr>
@@ -1884,7 +1682,7 @@
     </p:spTree>
     <p:extLst>
       <p:ext uri="{BB962C8B-B14F-4D97-AF65-F5344CB8AC3E}">
-        <p14:creationId xmlns:p14="http://schemas.microsoft.com/office/powerpoint/2010/main" val="3607949253"/>
+        <p14:creationId xmlns:p14="http://schemas.microsoft.com/office/powerpoint/2010/main" val="1670117259"/>
       </p:ext>
     </p:extLst>
   </p:cSld>
@@ -1913,13 +1711,7 @@
       </p:grpSpPr>
       <p:sp>
         <p:nvSpPr>
-          <p:cNvPr id="2" name="Titolo 1">
-            <a:extLst>
-              <a:ext uri="{FF2B5EF4-FFF2-40B4-BE49-F238E27FC236}">
-                <a16:creationId xmlns:a16="http://schemas.microsoft.com/office/drawing/2014/main" id="{BD9253E5-667C-A6BC-DD52-45EEBC70483E}"/>
-              </a:ext>
-            </a:extLst>
-          </p:cNvPr>
+          <p:cNvPr id="2" name="Title 1"/>
           <p:cNvSpPr>
             <a:spLocks noGrp="1"/>
           </p:cNvSpPr>
@@ -1936,18 +1728,13 @@
               <a:rPr lang="it-IT"/>
               <a:t>Fare clic per modificare lo stile del titolo dello schema</a:t>
             </a:r>
-          </a:p>
-        </p:txBody>
-      </p:sp>
-      <p:sp>
-        <p:nvSpPr>
-          <p:cNvPr id="3" name="Segnaposto data 2">
-            <a:extLst>
-              <a:ext uri="{FF2B5EF4-FFF2-40B4-BE49-F238E27FC236}">
-                <a16:creationId xmlns:a16="http://schemas.microsoft.com/office/drawing/2014/main" id="{D96C040B-C1C7-9A09-0984-EC1A2E884E25}"/>
-              </a:ext>
-            </a:extLst>
-          </p:cNvPr>
+            <a:endParaRPr lang="en-US" dirty="0"/>
+          </a:p>
+        </p:txBody>
+      </p:sp>
+      <p:sp>
+        <p:nvSpPr>
+          <p:cNvPr id="3" name="Date Placeholder 2"/>
           <p:cNvSpPr>
             <a:spLocks noGrp="1"/>
           </p:cNvSpPr>
@@ -1962,7 +1749,7 @@
           <a:p>
             <a:fld id="{1A270AA3-85FD-4336-B0B7-87033A430298}" type="datetimeFigureOut">
               <a:rPr lang="it-IT" smtClean="0"/>
-              <a:t>17/04/2023</a:t>
+              <a:t>18/04/2023</a:t>
             </a:fld>
             <a:endParaRPr lang="it-IT"/>
           </a:p>
@@ -1970,13 +1757,7 @@
       </p:sp>
       <p:sp>
         <p:nvSpPr>
-          <p:cNvPr id="4" name="Segnaposto piè di pagina 3">
-            <a:extLst>
-              <a:ext uri="{FF2B5EF4-FFF2-40B4-BE49-F238E27FC236}">
-                <a16:creationId xmlns:a16="http://schemas.microsoft.com/office/drawing/2014/main" id="{7E78B310-B51F-F170-F287-4660263B9D70}"/>
-              </a:ext>
-            </a:extLst>
-          </p:cNvPr>
+          <p:cNvPr id="4" name="Footer Placeholder 3"/>
           <p:cNvSpPr>
             <a:spLocks noGrp="1"/>
           </p:cNvSpPr>
@@ -1995,13 +1776,7 @@
       </p:sp>
       <p:sp>
         <p:nvSpPr>
-          <p:cNvPr id="5" name="Segnaposto numero diapositiva 4">
-            <a:extLst>
-              <a:ext uri="{FF2B5EF4-FFF2-40B4-BE49-F238E27FC236}">
-                <a16:creationId xmlns:a16="http://schemas.microsoft.com/office/drawing/2014/main" id="{65187E48-59AC-972C-72D1-F936932B09FF}"/>
-              </a:ext>
-            </a:extLst>
-          </p:cNvPr>
+          <p:cNvPr id="5" name="Slide Number Placeholder 4"/>
           <p:cNvSpPr>
             <a:spLocks noGrp="1"/>
           </p:cNvSpPr>
@@ -2025,7 +1800,7 @@
     </p:spTree>
     <p:extLst>
       <p:ext uri="{BB962C8B-B14F-4D97-AF65-F5344CB8AC3E}">
-        <p14:creationId xmlns:p14="http://schemas.microsoft.com/office/powerpoint/2010/main" val="878035521"/>
+        <p14:creationId xmlns:p14="http://schemas.microsoft.com/office/powerpoint/2010/main" val="3873427049"/>
       </p:ext>
     </p:extLst>
   </p:cSld>
@@ -2054,13 +1829,7 @@
       </p:grpSpPr>
       <p:sp>
         <p:nvSpPr>
-          <p:cNvPr id="2" name="Segnaposto data 1">
-            <a:extLst>
-              <a:ext uri="{FF2B5EF4-FFF2-40B4-BE49-F238E27FC236}">
-                <a16:creationId xmlns:a16="http://schemas.microsoft.com/office/drawing/2014/main" id="{F53A58EC-362F-A541-87E6-3860B442BCAA}"/>
-              </a:ext>
-            </a:extLst>
-          </p:cNvPr>
+          <p:cNvPr id="2" name="Date Placeholder 1"/>
           <p:cNvSpPr>
             <a:spLocks noGrp="1"/>
           </p:cNvSpPr>
@@ -2075,7 +1844,7 @@
           <a:p>
             <a:fld id="{1A270AA3-85FD-4336-B0B7-87033A430298}" type="datetimeFigureOut">
               <a:rPr lang="it-IT" smtClean="0"/>
-              <a:t>17/04/2023</a:t>
+              <a:t>18/04/2023</a:t>
             </a:fld>
             <a:endParaRPr lang="it-IT"/>
           </a:p>
@@ -2083,13 +1852,7 @@
       </p:sp>
       <p:sp>
         <p:nvSpPr>
-          <p:cNvPr id="3" name="Segnaposto piè di pagina 2">
-            <a:extLst>
-              <a:ext uri="{FF2B5EF4-FFF2-40B4-BE49-F238E27FC236}">
-                <a16:creationId xmlns:a16="http://schemas.microsoft.com/office/drawing/2014/main" id="{18092009-2FA7-2260-B2D8-2C4908BCDE5F}"/>
-              </a:ext>
-            </a:extLst>
-          </p:cNvPr>
+          <p:cNvPr id="3" name="Footer Placeholder 2"/>
           <p:cNvSpPr>
             <a:spLocks noGrp="1"/>
           </p:cNvSpPr>
@@ -2108,13 +1871,7 @@
       </p:sp>
       <p:sp>
         <p:nvSpPr>
-          <p:cNvPr id="4" name="Segnaposto numero diapositiva 3">
-            <a:extLst>
-              <a:ext uri="{FF2B5EF4-FFF2-40B4-BE49-F238E27FC236}">
-                <a16:creationId xmlns:a16="http://schemas.microsoft.com/office/drawing/2014/main" id="{93185B92-9CB8-72B2-BDC5-52FB03CDF58C}"/>
-              </a:ext>
-            </a:extLst>
-          </p:cNvPr>
+          <p:cNvPr id="4" name="Slide Number Placeholder 3"/>
           <p:cNvSpPr>
             <a:spLocks noGrp="1"/>
           </p:cNvSpPr>
@@ -2138,7 +1895,7 @@
     </p:spTree>
     <p:extLst>
       <p:ext uri="{BB962C8B-B14F-4D97-AF65-F5344CB8AC3E}">
-        <p14:creationId xmlns:p14="http://schemas.microsoft.com/office/powerpoint/2010/main" val="1976782508"/>
+        <p14:creationId xmlns:p14="http://schemas.microsoft.com/office/powerpoint/2010/main" val="915210558"/>
       </p:ext>
     </p:extLst>
   </p:cSld>
@@ -2167,13 +1924,7 @@
       </p:grpSpPr>
       <p:sp>
         <p:nvSpPr>
-          <p:cNvPr id="2" name="Titolo 1">
-            <a:extLst>
-              <a:ext uri="{FF2B5EF4-FFF2-40B4-BE49-F238E27FC236}">
-                <a16:creationId xmlns:a16="http://schemas.microsoft.com/office/drawing/2014/main" id="{5EB7B537-367E-F285-0054-4C889087709B}"/>
-              </a:ext>
-            </a:extLst>
-          </p:cNvPr>
+          <p:cNvPr id="2" name="Title 1"/>
           <p:cNvSpPr>
             <a:spLocks noGrp="1"/>
           </p:cNvSpPr>
@@ -2199,18 +1950,13 @@
               <a:rPr lang="it-IT"/>
               <a:t>Fare clic per modificare lo stile del titolo dello schema</a:t>
             </a:r>
-          </a:p>
-        </p:txBody>
-      </p:sp>
-      <p:sp>
-        <p:nvSpPr>
-          <p:cNvPr id="3" name="Segnaposto contenuto 2">
-            <a:extLst>
-              <a:ext uri="{FF2B5EF4-FFF2-40B4-BE49-F238E27FC236}">
-                <a16:creationId xmlns:a16="http://schemas.microsoft.com/office/drawing/2014/main" id="{AE622DBC-FF25-34E1-3E4D-0FC60489A14C}"/>
-              </a:ext>
-            </a:extLst>
-          </p:cNvPr>
+            <a:endParaRPr lang="en-US" dirty="0"/>
+          </a:p>
+        </p:txBody>
+      </p:sp>
+      <p:sp>
+        <p:nvSpPr>
+          <p:cNvPr id="3" name="Content Placeholder 2"/>
           <p:cNvSpPr>
             <a:spLocks noGrp="1"/>
           </p:cNvSpPr>
@@ -2289,18 +2035,13 @@
               <a:rPr lang="it-IT"/>
               <a:t>Quinto livello</a:t>
             </a:r>
-          </a:p>
-        </p:txBody>
-      </p:sp>
-      <p:sp>
-        <p:nvSpPr>
-          <p:cNvPr id="4" name="Segnaposto testo 3">
-            <a:extLst>
-              <a:ext uri="{FF2B5EF4-FFF2-40B4-BE49-F238E27FC236}">
-                <a16:creationId xmlns:a16="http://schemas.microsoft.com/office/drawing/2014/main" id="{31A8E014-C43F-D661-2EF6-631B2962C3CD}"/>
-              </a:ext>
-            </a:extLst>
-          </p:cNvPr>
+            <a:endParaRPr lang="en-US" dirty="0"/>
+          </a:p>
+        </p:txBody>
+      </p:sp>
+      <p:sp>
+        <p:nvSpPr>
+          <p:cNvPr id="4" name="Text Placeholder 3"/>
           <p:cNvSpPr>
             <a:spLocks noGrp="1"/>
           </p:cNvSpPr>
@@ -2365,13 +2106,7 @@
       </p:sp>
       <p:sp>
         <p:nvSpPr>
-          <p:cNvPr id="5" name="Segnaposto data 4">
-            <a:extLst>
-              <a:ext uri="{FF2B5EF4-FFF2-40B4-BE49-F238E27FC236}">
-                <a16:creationId xmlns:a16="http://schemas.microsoft.com/office/drawing/2014/main" id="{82E47081-0C03-D952-DCF9-5F19CB3AABD4}"/>
-              </a:ext>
-            </a:extLst>
-          </p:cNvPr>
+          <p:cNvPr id="5" name="Date Placeholder 4"/>
           <p:cNvSpPr>
             <a:spLocks noGrp="1"/>
           </p:cNvSpPr>
@@ -2386,7 +2121,7 @@
           <a:p>
             <a:fld id="{1A270AA3-85FD-4336-B0B7-87033A430298}" type="datetimeFigureOut">
               <a:rPr lang="it-IT" smtClean="0"/>
-              <a:t>17/04/2023</a:t>
+              <a:t>18/04/2023</a:t>
             </a:fld>
             <a:endParaRPr lang="it-IT"/>
           </a:p>
@@ -2394,13 +2129,7 @@
       </p:sp>
       <p:sp>
         <p:nvSpPr>
-          <p:cNvPr id="6" name="Segnaposto piè di pagina 5">
-            <a:extLst>
-              <a:ext uri="{FF2B5EF4-FFF2-40B4-BE49-F238E27FC236}">
-                <a16:creationId xmlns:a16="http://schemas.microsoft.com/office/drawing/2014/main" id="{095E8A6A-3759-1979-F35B-669EB78DAE19}"/>
-              </a:ext>
-            </a:extLst>
-          </p:cNvPr>
+          <p:cNvPr id="6" name="Footer Placeholder 5"/>
           <p:cNvSpPr>
             <a:spLocks noGrp="1"/>
           </p:cNvSpPr>
@@ -2419,13 +2148,7 @@
       </p:sp>
       <p:sp>
         <p:nvSpPr>
-          <p:cNvPr id="7" name="Segnaposto numero diapositiva 6">
-            <a:extLst>
-              <a:ext uri="{FF2B5EF4-FFF2-40B4-BE49-F238E27FC236}">
-                <a16:creationId xmlns:a16="http://schemas.microsoft.com/office/drawing/2014/main" id="{A08337BE-4BA5-DF20-BEA2-C1D40E0299E0}"/>
-              </a:ext>
-            </a:extLst>
-          </p:cNvPr>
+          <p:cNvPr id="7" name="Slide Number Placeholder 6"/>
           <p:cNvSpPr>
             <a:spLocks noGrp="1"/>
           </p:cNvSpPr>
@@ -2449,7 +2172,7 @@
     </p:spTree>
     <p:extLst>
       <p:ext uri="{BB962C8B-B14F-4D97-AF65-F5344CB8AC3E}">
-        <p14:creationId xmlns:p14="http://schemas.microsoft.com/office/powerpoint/2010/main" val="2939104082"/>
+        <p14:creationId xmlns:p14="http://schemas.microsoft.com/office/powerpoint/2010/main" val="1430814557"/>
       </p:ext>
     </p:extLst>
   </p:cSld>
@@ -2478,13 +2201,7 @@
       </p:grpSpPr>
       <p:sp>
         <p:nvSpPr>
-          <p:cNvPr id="2" name="Titolo 1">
-            <a:extLst>
-              <a:ext uri="{FF2B5EF4-FFF2-40B4-BE49-F238E27FC236}">
-                <a16:creationId xmlns:a16="http://schemas.microsoft.com/office/drawing/2014/main" id="{8EE97C62-4056-2620-C4F1-DF1476FA4615}"/>
-              </a:ext>
-            </a:extLst>
-          </p:cNvPr>
+          <p:cNvPr id="2" name="Title 1"/>
           <p:cNvSpPr>
             <a:spLocks noGrp="1"/>
           </p:cNvSpPr>
@@ -2510,20 +2227,15 @@
               <a:rPr lang="it-IT"/>
               <a:t>Fare clic per modificare lo stile del titolo dello schema</a:t>
             </a:r>
-          </a:p>
-        </p:txBody>
-      </p:sp>
-      <p:sp>
-        <p:nvSpPr>
-          <p:cNvPr id="3" name="Segnaposto immagine 2">
-            <a:extLst>
-              <a:ext uri="{FF2B5EF4-FFF2-40B4-BE49-F238E27FC236}">
-                <a16:creationId xmlns:a16="http://schemas.microsoft.com/office/drawing/2014/main" id="{1B0ABC3E-3887-47BA-CE4C-50E05F75FA2D}"/>
-              </a:ext>
-            </a:extLst>
-          </p:cNvPr>
-          <p:cNvSpPr>
-            <a:spLocks noGrp="1"/>
+            <a:endParaRPr lang="en-US" dirty="0"/>
+          </a:p>
+        </p:txBody>
+      </p:sp>
+      <p:sp>
+        <p:nvSpPr>
+          <p:cNvPr id="3" name="Picture Placeholder 2"/>
+          <p:cNvSpPr>
+            <a:spLocks noGrp="1" noChangeAspect="1"/>
           </p:cNvSpPr>
           <p:nvPr>
             <p:ph type="pic" idx="1"/>
@@ -2536,7 +2248,7 @@
           </a:xfrm>
         </p:spPr>
         <p:txBody>
-          <a:bodyPr/>
+          <a:bodyPr anchor="t"/>
           <a:lstStyle>
             <a:lvl1pPr marL="0" indent="0">
               <a:buNone/>
@@ -2576,19 +2288,17 @@
             </a:lvl9pPr>
           </a:lstStyle>
           <a:p>
-            <a:endParaRPr lang="it-IT"/>
-          </a:p>
-        </p:txBody>
-      </p:sp>
-      <p:sp>
-        <p:nvSpPr>
-          <p:cNvPr id="4" name="Segnaposto testo 3">
-            <a:extLst>
-              <a:ext uri="{FF2B5EF4-FFF2-40B4-BE49-F238E27FC236}">
-                <a16:creationId xmlns:a16="http://schemas.microsoft.com/office/drawing/2014/main" id="{7B8FD5DA-CD5A-AD8D-A9A1-60277C9F8F30}"/>
-              </a:ext>
-            </a:extLst>
-          </p:cNvPr>
+            <a:r>
+              <a:rPr lang="it-IT"/>
+              <a:t>Fare clic sull'icona per inserire un'immagine</a:t>
+            </a:r>
+            <a:endParaRPr lang="en-US" dirty="0"/>
+          </a:p>
+        </p:txBody>
+      </p:sp>
+      <p:sp>
+        <p:nvSpPr>
+          <p:cNvPr id="4" name="Text Placeholder 3"/>
           <p:cNvSpPr>
             <a:spLocks noGrp="1"/>
           </p:cNvSpPr>
@@ -2653,13 +2363,7 @@
       </p:sp>
       <p:sp>
         <p:nvSpPr>
-          <p:cNvPr id="5" name="Segnaposto data 4">
-            <a:extLst>
-              <a:ext uri="{FF2B5EF4-FFF2-40B4-BE49-F238E27FC236}">
-                <a16:creationId xmlns:a16="http://schemas.microsoft.com/office/drawing/2014/main" id="{DC36F57A-6490-5A4C-0BF5-942446886856}"/>
-              </a:ext>
-            </a:extLst>
-          </p:cNvPr>
+          <p:cNvPr id="5" name="Date Placeholder 4"/>
           <p:cNvSpPr>
             <a:spLocks noGrp="1"/>
           </p:cNvSpPr>
@@ -2674,7 +2378,7 @@
           <a:p>
             <a:fld id="{1A270AA3-85FD-4336-B0B7-87033A430298}" type="datetimeFigureOut">
               <a:rPr lang="it-IT" smtClean="0"/>
-              <a:t>17/04/2023</a:t>
+              <a:t>18/04/2023</a:t>
             </a:fld>
             <a:endParaRPr lang="it-IT"/>
           </a:p>
@@ -2682,13 +2386,7 @@
       </p:sp>
       <p:sp>
         <p:nvSpPr>
-          <p:cNvPr id="6" name="Segnaposto piè di pagina 5">
-            <a:extLst>
-              <a:ext uri="{FF2B5EF4-FFF2-40B4-BE49-F238E27FC236}">
-                <a16:creationId xmlns:a16="http://schemas.microsoft.com/office/drawing/2014/main" id="{F28AD155-4017-631B-EFB1-802EE5361310}"/>
-              </a:ext>
-            </a:extLst>
-          </p:cNvPr>
+          <p:cNvPr id="6" name="Footer Placeholder 5"/>
           <p:cNvSpPr>
             <a:spLocks noGrp="1"/>
           </p:cNvSpPr>
@@ -2707,13 +2405,7 @@
       </p:sp>
       <p:sp>
         <p:nvSpPr>
-          <p:cNvPr id="7" name="Segnaposto numero diapositiva 6">
-            <a:extLst>
-              <a:ext uri="{FF2B5EF4-FFF2-40B4-BE49-F238E27FC236}">
-                <a16:creationId xmlns:a16="http://schemas.microsoft.com/office/drawing/2014/main" id="{56E0AC4A-7303-93E6-2D67-76FF4519110A}"/>
-              </a:ext>
-            </a:extLst>
-          </p:cNvPr>
+          <p:cNvPr id="7" name="Slide Number Placeholder 6"/>
           <p:cNvSpPr>
             <a:spLocks noGrp="1"/>
           </p:cNvSpPr>
@@ -2737,7 +2429,7 @@
     </p:spTree>
     <p:extLst>
       <p:ext uri="{BB962C8B-B14F-4D97-AF65-F5344CB8AC3E}">
-        <p14:creationId xmlns:p14="http://schemas.microsoft.com/office/powerpoint/2010/main" val="2489067521"/>
+        <p14:creationId xmlns:p14="http://schemas.microsoft.com/office/powerpoint/2010/main" val="2009665990"/>
       </p:ext>
     </p:extLst>
   </p:cSld>
@@ -2771,13 +2463,7 @@
       </p:grpSpPr>
       <p:sp>
         <p:nvSpPr>
-          <p:cNvPr id="2" name="Segnaposto titolo 1">
-            <a:extLst>
-              <a:ext uri="{FF2B5EF4-FFF2-40B4-BE49-F238E27FC236}">
-                <a16:creationId xmlns:a16="http://schemas.microsoft.com/office/drawing/2014/main" id="{B75EF6F2-3BEA-8EDF-89C5-61ECFFD39849}"/>
-              </a:ext>
-            </a:extLst>
-          </p:cNvPr>
+          <p:cNvPr id="2" name="Title Placeholder 1"/>
           <p:cNvSpPr>
             <a:spLocks noGrp="1"/>
           </p:cNvSpPr>
@@ -2804,18 +2490,13 @@
               <a:rPr lang="it-IT"/>
               <a:t>Fare clic per modificare lo stile del titolo dello schema</a:t>
             </a:r>
-          </a:p>
-        </p:txBody>
-      </p:sp>
-      <p:sp>
-        <p:nvSpPr>
-          <p:cNvPr id="3" name="Segnaposto testo 2">
-            <a:extLst>
-              <a:ext uri="{FF2B5EF4-FFF2-40B4-BE49-F238E27FC236}">
-                <a16:creationId xmlns:a16="http://schemas.microsoft.com/office/drawing/2014/main" id="{939AF4F4-9F9E-351E-15BF-5C6E0C0B84A6}"/>
-              </a:ext>
-            </a:extLst>
-          </p:cNvPr>
+            <a:endParaRPr lang="en-US" dirty="0"/>
+          </a:p>
+        </p:txBody>
+      </p:sp>
+      <p:sp>
+        <p:nvSpPr>
+          <p:cNvPr id="3" name="Text Placeholder 2"/>
           <p:cNvSpPr>
             <a:spLocks noGrp="1"/>
           </p:cNvSpPr>
@@ -2871,18 +2552,13 @@
               <a:rPr lang="it-IT"/>
               <a:t>Quinto livello</a:t>
             </a:r>
-          </a:p>
-        </p:txBody>
-      </p:sp>
-      <p:sp>
-        <p:nvSpPr>
-          <p:cNvPr id="4" name="Segnaposto data 3">
-            <a:extLst>
-              <a:ext uri="{FF2B5EF4-FFF2-40B4-BE49-F238E27FC236}">
-                <a16:creationId xmlns:a16="http://schemas.microsoft.com/office/drawing/2014/main" id="{20DAB987-5195-A63B-EE98-C85FEFFED11E}"/>
-              </a:ext>
-            </a:extLst>
-          </p:cNvPr>
+            <a:endParaRPr lang="en-US" dirty="0"/>
+          </a:p>
+        </p:txBody>
+      </p:sp>
+      <p:sp>
+        <p:nvSpPr>
+          <p:cNvPr id="4" name="Date Placeholder 3"/>
           <p:cNvSpPr>
             <a:spLocks noGrp="1"/>
           </p:cNvSpPr>
@@ -2915,7 +2591,7 @@
           <a:p>
             <a:fld id="{1A270AA3-85FD-4336-B0B7-87033A430298}" type="datetimeFigureOut">
               <a:rPr lang="it-IT" smtClean="0"/>
-              <a:t>17/04/2023</a:t>
+              <a:t>18/04/2023</a:t>
             </a:fld>
             <a:endParaRPr lang="it-IT"/>
           </a:p>
@@ -2923,13 +2599,7 @@
       </p:sp>
       <p:sp>
         <p:nvSpPr>
-          <p:cNvPr id="5" name="Segnaposto piè di pagina 4">
-            <a:extLst>
-              <a:ext uri="{FF2B5EF4-FFF2-40B4-BE49-F238E27FC236}">
-                <a16:creationId xmlns:a16="http://schemas.microsoft.com/office/drawing/2014/main" id="{A4A81F4E-EC1A-379B-8F05-5CAAB9FC984E}"/>
-              </a:ext>
-            </a:extLst>
-          </p:cNvPr>
+          <p:cNvPr id="5" name="Footer Placeholder 4"/>
           <p:cNvSpPr>
             <a:spLocks noGrp="1"/>
           </p:cNvSpPr>
@@ -2966,13 +2636,7 @@
       </p:sp>
       <p:sp>
         <p:nvSpPr>
-          <p:cNvPr id="6" name="Segnaposto numero diapositiva 5">
-            <a:extLst>
-              <a:ext uri="{FF2B5EF4-FFF2-40B4-BE49-F238E27FC236}">
-                <a16:creationId xmlns:a16="http://schemas.microsoft.com/office/drawing/2014/main" id="{20AC542A-1493-875B-65DB-878F60089FC2}"/>
-              </a:ext>
-            </a:extLst>
-          </p:cNvPr>
+          <p:cNvPr id="6" name="Slide Number Placeholder 5"/>
           <p:cNvSpPr>
             <a:spLocks noGrp="1"/>
           </p:cNvSpPr>
@@ -3014,23 +2678,23 @@
     </p:spTree>
     <p:extLst>
       <p:ext uri="{BB962C8B-B14F-4D97-AF65-F5344CB8AC3E}">
-        <p14:creationId xmlns:p14="http://schemas.microsoft.com/office/powerpoint/2010/main" val="2606241361"/>
+        <p14:creationId xmlns:p14="http://schemas.microsoft.com/office/powerpoint/2010/main" val="2054013758"/>
       </p:ext>
     </p:extLst>
   </p:cSld>
   <p:clrMap bg1="lt1" tx1="dk1" bg2="lt2" tx2="dk2" accent1="accent1" accent2="accent2" accent3="accent3" accent4="accent4" accent5="accent5" accent6="accent6" hlink="hlink" folHlink="folHlink"/>
   <p:sldLayoutIdLst>
-    <p:sldLayoutId id="2147483649" r:id="rId1"/>
-    <p:sldLayoutId id="2147483650" r:id="rId2"/>
-    <p:sldLayoutId id="2147483651" r:id="rId3"/>
-    <p:sldLayoutId id="2147483652" r:id="rId4"/>
-    <p:sldLayoutId id="2147483653" r:id="rId5"/>
-    <p:sldLayoutId id="2147483654" r:id="rId6"/>
-    <p:sldLayoutId id="2147483655" r:id="rId7"/>
-    <p:sldLayoutId id="2147483656" r:id="rId8"/>
-    <p:sldLayoutId id="2147483657" r:id="rId9"/>
-    <p:sldLayoutId id="2147483658" r:id="rId10"/>
-    <p:sldLayoutId id="2147483659" r:id="rId11"/>
+    <p:sldLayoutId id="2147483697" r:id="rId1"/>
+    <p:sldLayoutId id="2147483698" r:id="rId2"/>
+    <p:sldLayoutId id="2147483699" r:id="rId3"/>
+    <p:sldLayoutId id="2147483700" r:id="rId4"/>
+    <p:sldLayoutId id="2147483701" r:id="rId5"/>
+    <p:sldLayoutId id="2147483702" r:id="rId6"/>
+    <p:sldLayoutId id="2147483703" r:id="rId7"/>
+    <p:sldLayoutId id="2147483704" r:id="rId8"/>
+    <p:sldLayoutId id="2147483705" r:id="rId9"/>
+    <p:sldLayoutId id="2147483706" r:id="rId10"/>
+    <p:sldLayoutId id="2147483707" r:id="rId11"/>
   </p:sldLayoutIdLst>
   <p:txStyles>
     <p:titleStyle>
@@ -3218,7 +2882,7 @@
     </p:bodyStyle>
     <p:otherStyle>
       <a:defPPr>
-        <a:defRPr lang="it-IT"/>
+        <a:defRPr lang="en-US"/>
       </a:defPPr>
       <a:lvl1pPr marL="0" algn="l" defTabSz="914400" rtl="0" eaLnBrk="1" latinLnBrk="0" hangingPunct="1">
         <a:defRPr sz="1800" kern="1200">
@@ -3523,6 +3187,14 @@
 <file path=ppt/slides/slide11.xml><?xml version="1.0" encoding="utf-8"?>
 <p:sld xmlns:a="http://schemas.openxmlformats.org/drawingml/2006/main" xmlns:r="http://schemas.openxmlformats.org/officeDocument/2006/relationships" xmlns:p="http://schemas.openxmlformats.org/presentationml/2006/main">
   <p:cSld>
+    <p:bg>
+      <p:bgPr>
+        <a:solidFill>
+          <a:schemeClr val="bg1"/>
+        </a:solidFill>
+        <a:effectLst/>
+      </p:bgPr>
+    </p:bg>
     <p:spTree>
       <p:nvGrpSpPr>
         <p:cNvPr id="1" name=""/>
@@ -3553,43 +3225,668 @@
             <p:ph type="title"/>
           </p:nvPr>
         </p:nvSpPr>
-        <p:spPr/>
-        <p:txBody>
-          <a:bodyPr/>
-          <a:lstStyle/>
-          <a:p>
+        <p:spPr>
+          <a:xfrm>
+            <a:off x="2791441" y="5185853"/>
+            <a:ext cx="1483743" cy="624010"/>
+          </a:xfrm>
+          <a:noFill/>
+        </p:spPr>
+        <p:txBody>
+          <a:bodyPr vert="horz" lIns="91440" tIns="45720" rIns="91440" bIns="45720" rtlCol="0" anchor="ctr">
+            <a:normAutofit/>
+          </a:bodyPr>
+          <a:lstStyle/>
+          <a:p>
+            <a:pPr algn="ctr"/>
+            <a:endParaRPr lang="en-US" sz="3600" kern="1200" dirty="0">
+              <a:solidFill>
+                <a:srgbClr val="FFFFFF"/>
+              </a:solidFill>
+              <a:latin typeface="+mj-lt"/>
+              <a:ea typeface="+mj-ea"/>
+              <a:cs typeface="+mj-cs"/>
+            </a:endParaRPr>
+          </a:p>
+        </p:txBody>
+      </p:sp>
+      <p:pic>
+        <p:nvPicPr>
+          <p:cNvPr id="55" name="Immagine 54" descr="Immagine che contiene testo&#10;&#10;Descrizione generata automaticamente">
+            <a:extLst>
+              <a:ext uri="{FF2B5EF4-FFF2-40B4-BE49-F238E27FC236}">
+                <a16:creationId xmlns:a16="http://schemas.microsoft.com/office/drawing/2014/main" id="{19EB1030-11EA-1CE7-0599-14FD9F4116CC}"/>
+              </a:ext>
+            </a:extLst>
+          </p:cNvPr>
+          <p:cNvPicPr>
+            <a:picLocks noChangeAspect="1"/>
+          </p:cNvPicPr>
+          <p:nvPr/>
+        </p:nvPicPr>
+        <p:blipFill>
+          <a:blip r:embed="rId2">
+            <a:extLst>
+              <a:ext uri="{28A0092B-C50C-407E-A947-70E740481C1C}">
+                <a14:useLocalDpi xmlns:a14="http://schemas.microsoft.com/office/drawing/2010/main" val="0"/>
+              </a:ext>
+            </a:extLst>
+          </a:blip>
+          <a:stretch>
+            <a:fillRect/>
+          </a:stretch>
+        </p:blipFill>
+        <p:spPr>
+          <a:xfrm rot="5400000">
+            <a:off x="-333632" y="2512426"/>
+            <a:ext cx="4870412" cy="3716382"/>
+          </a:xfrm>
+          <a:prstGeom prst="rect">
+            <a:avLst/>
+          </a:prstGeom>
+        </p:spPr>
+      </p:pic>
+      <p:sp>
+        <p:nvSpPr>
+          <p:cNvPr id="50" name="Freccia a pentagono 49">
+            <a:extLst>
+              <a:ext uri="{FF2B5EF4-FFF2-40B4-BE49-F238E27FC236}">
+                <a16:creationId xmlns:a16="http://schemas.microsoft.com/office/drawing/2014/main" id="{242B7F2F-CD65-9BFE-6CA3-0527428DE06E}"/>
+              </a:ext>
+            </a:extLst>
+          </p:cNvPr>
+          <p:cNvSpPr/>
+          <p:nvPr/>
+        </p:nvSpPr>
+        <p:spPr>
+          <a:xfrm>
+            <a:off x="412060" y="52177"/>
+            <a:ext cx="3121253" cy="1915089"/>
+          </a:xfrm>
+          <a:prstGeom prst="homePlate">
+            <a:avLst/>
+          </a:prstGeom>
+        </p:spPr>
+        <p:style>
+          <a:lnRef idx="2">
+            <a:schemeClr val="accent3">
+              <a:shade val="50000"/>
+            </a:schemeClr>
+          </a:lnRef>
+          <a:fillRef idx="1">
+            <a:schemeClr val="accent3"/>
+          </a:fillRef>
+          <a:effectRef idx="0">
+            <a:schemeClr val="accent3"/>
+          </a:effectRef>
+          <a:fontRef idx="minor">
+            <a:schemeClr val="lt1"/>
+          </a:fontRef>
+        </p:style>
+        <p:txBody>
+          <a:bodyPr rtlCol="0" anchor="ctr"/>
+          <a:lstStyle/>
+          <a:p>
+            <a:pPr algn="ctr"/>
+            <a:endParaRPr lang="en-US" dirty="0"/>
+          </a:p>
+        </p:txBody>
+      </p:sp>
+      <p:sp>
+        <p:nvSpPr>
+          <p:cNvPr id="29" name="Rettangolo 28">
+            <a:extLst>
+              <a:ext uri="{FF2B5EF4-FFF2-40B4-BE49-F238E27FC236}">
+                <a16:creationId xmlns:a16="http://schemas.microsoft.com/office/drawing/2014/main" id="{E2FFAD3C-07E3-58C6-AAE5-FFEBEA7E115F}"/>
+              </a:ext>
+            </a:extLst>
+          </p:cNvPr>
+          <p:cNvSpPr/>
+          <p:nvPr/>
+        </p:nvSpPr>
+        <p:spPr>
+          <a:xfrm>
+            <a:off x="4275184" y="0"/>
+            <a:ext cx="7916816" cy="3429000"/>
+          </a:xfrm>
+          <a:prstGeom prst="rect">
+            <a:avLst/>
+          </a:prstGeom>
+        </p:spPr>
+        <p:style>
+          <a:lnRef idx="2">
+            <a:schemeClr val="accent1">
+              <a:shade val="50000"/>
+            </a:schemeClr>
+          </a:lnRef>
+          <a:fillRef idx="1">
+            <a:schemeClr val="accent1"/>
+          </a:fillRef>
+          <a:effectRef idx="0">
+            <a:schemeClr val="accent1"/>
+          </a:effectRef>
+          <a:fontRef idx="minor">
+            <a:schemeClr val="lt1"/>
+          </a:fontRef>
+        </p:style>
+        <p:txBody>
+          <a:bodyPr rtlCol="0" anchor="ctr"/>
+          <a:lstStyle/>
+          <a:p>
+            <a:pPr algn="ctr"/>
+            <a:endParaRPr lang="en-US" dirty="0">
+              <a:ln w="0"/>
+              <a:solidFill>
+                <a:schemeClr val="tx1"/>
+              </a:solidFill>
+              <a:effectLst>
+                <a:outerShdw blurRad="38100" dist="19050" dir="2700000" algn="tl" rotWithShape="0">
+                  <a:schemeClr val="dk1">
+                    <a:alpha val="40000"/>
+                  </a:schemeClr>
+                </a:outerShdw>
+              </a:effectLst>
+            </a:endParaRPr>
+          </a:p>
+        </p:txBody>
+      </p:sp>
+      <p:sp>
+        <p:nvSpPr>
+          <p:cNvPr id="51" name="CasellaDiTesto 50">
+            <a:extLst>
+              <a:ext uri="{FF2B5EF4-FFF2-40B4-BE49-F238E27FC236}">
+                <a16:creationId xmlns:a16="http://schemas.microsoft.com/office/drawing/2014/main" id="{2F1B6880-124C-F0B4-6214-08CC90BDB112}"/>
+              </a:ext>
+            </a:extLst>
+          </p:cNvPr>
+          <p:cNvSpPr txBox="1"/>
+          <p:nvPr/>
+        </p:nvSpPr>
+        <p:spPr>
+          <a:xfrm>
+            <a:off x="696024" y="762487"/>
+            <a:ext cx="2091609" cy="523220"/>
+          </a:xfrm>
+          <a:prstGeom prst="rect">
+            <a:avLst/>
+          </a:prstGeom>
+          <a:noFill/>
+        </p:spPr>
+        <p:txBody>
+          <a:bodyPr wrap="square" rtlCol="0">
+            <a:spAutoFit/>
+          </a:bodyPr>
+          <a:lstStyle/>
+          <a:p>
+            <a:r>
+              <a:rPr lang="it-IT" sz="2800" dirty="0"/>
+              <a:t>Autoencoder</a:t>
+            </a:r>
+            <a:endParaRPr lang="en-US" sz="2800" dirty="0"/>
+          </a:p>
+        </p:txBody>
+      </p:sp>
+      <p:sp>
+        <p:nvSpPr>
+          <p:cNvPr id="31" name="Rettangolo 30">
+            <a:extLst>
+              <a:ext uri="{FF2B5EF4-FFF2-40B4-BE49-F238E27FC236}">
+                <a16:creationId xmlns:a16="http://schemas.microsoft.com/office/drawing/2014/main" id="{37B9362A-CD26-7C04-A44C-7748284AB883}"/>
+              </a:ext>
+            </a:extLst>
+          </p:cNvPr>
+          <p:cNvSpPr/>
+          <p:nvPr/>
+        </p:nvSpPr>
+        <p:spPr>
+          <a:xfrm>
+            <a:off x="4266306" y="3429000"/>
+            <a:ext cx="7930857" cy="3429001"/>
+          </a:xfrm>
+          <a:prstGeom prst="rect">
+            <a:avLst/>
+          </a:prstGeom>
+        </p:spPr>
+        <p:style>
+          <a:lnRef idx="2">
+            <a:schemeClr val="accent2">
+              <a:shade val="50000"/>
+            </a:schemeClr>
+          </a:lnRef>
+          <a:fillRef idx="1">
+            <a:schemeClr val="accent2"/>
+          </a:fillRef>
+          <a:effectRef idx="0">
+            <a:schemeClr val="accent2"/>
+          </a:effectRef>
+          <a:fontRef idx="minor">
+            <a:schemeClr val="lt1"/>
+          </a:fontRef>
+        </p:style>
+        <p:txBody>
+          <a:bodyPr rtlCol="0" anchor="ctr"/>
+          <a:lstStyle/>
+          <a:p>
+            <a:pPr algn="ctr"/>
+            <a:endParaRPr lang="en-US"/>
+          </a:p>
+        </p:txBody>
+      </p:sp>
+      <p:pic>
+        <p:nvPicPr>
+          <p:cNvPr id="66" name="Immagine 65" descr="Immagine che contiene diagramma&#10;&#10;Descrizione generata automaticamente">
+            <a:extLst>
+              <a:ext uri="{FF2B5EF4-FFF2-40B4-BE49-F238E27FC236}">
+                <a16:creationId xmlns:a16="http://schemas.microsoft.com/office/drawing/2014/main" id="{34993745-140E-0F46-3D23-3689FEF6804E}"/>
+              </a:ext>
+            </a:extLst>
+          </p:cNvPr>
+          <p:cNvPicPr>
+            <a:picLocks noChangeAspect="1"/>
+          </p:cNvPicPr>
+          <p:nvPr/>
+        </p:nvPicPr>
+        <p:blipFill>
+          <a:blip r:embed="rId3">
+            <a:extLst>
+              <a:ext uri="{28A0092B-C50C-407E-A947-70E740481C1C}">
+                <a14:useLocalDpi xmlns:a14="http://schemas.microsoft.com/office/drawing/2010/main" val="0"/>
+              </a:ext>
+            </a:extLst>
+          </a:blip>
+          <a:stretch>
+            <a:fillRect/>
+          </a:stretch>
+        </p:blipFill>
+        <p:spPr>
+          <a:xfrm>
+            <a:off x="4346606" y="1024097"/>
+            <a:ext cx="3090212" cy="2342116"/>
+          </a:xfrm>
+          <a:prstGeom prst="rect">
+            <a:avLst/>
+          </a:prstGeom>
+        </p:spPr>
+      </p:pic>
+      <p:pic>
+        <p:nvPicPr>
+          <p:cNvPr id="67" name="Immagine 66">
+            <a:extLst>
+              <a:ext uri="{FF2B5EF4-FFF2-40B4-BE49-F238E27FC236}">
+                <a16:creationId xmlns:a16="http://schemas.microsoft.com/office/drawing/2014/main" id="{6C5C92B8-A856-F936-07FA-C4EE97CE0B5A}"/>
+              </a:ext>
+            </a:extLst>
+          </p:cNvPr>
+          <p:cNvPicPr>
+            <a:picLocks noChangeAspect="1"/>
+          </p:cNvPicPr>
+          <p:nvPr/>
+        </p:nvPicPr>
+        <p:blipFill>
+          <a:blip r:embed="rId4">
+            <a:extLst>
+              <a:ext uri="{28A0092B-C50C-407E-A947-70E740481C1C}">
+                <a14:useLocalDpi xmlns:a14="http://schemas.microsoft.com/office/drawing/2010/main" val="0"/>
+              </a:ext>
+            </a:extLst>
+          </a:blip>
+          <a:srcRect/>
+          <a:stretch/>
+        </p:blipFill>
+        <p:spPr>
+          <a:xfrm>
+            <a:off x="9035402" y="118272"/>
+            <a:ext cx="3090212" cy="2334869"/>
+          </a:xfrm>
+          <a:prstGeom prst="rect">
+            <a:avLst/>
+          </a:prstGeom>
+        </p:spPr>
+      </p:pic>
+      <p:cxnSp>
+        <p:nvCxnSpPr>
+          <p:cNvPr id="69" name="Connettore curvo 68">
+            <a:extLst>
+              <a:ext uri="{FF2B5EF4-FFF2-40B4-BE49-F238E27FC236}">
+                <a16:creationId xmlns:a16="http://schemas.microsoft.com/office/drawing/2014/main" id="{38175ADA-197E-8572-53F1-447A991D63EE}"/>
+              </a:ext>
+            </a:extLst>
+          </p:cNvPr>
+          <p:cNvCxnSpPr>
+            <a:cxnSpLocks/>
+            <a:stCxn id="66" idx="3"/>
+            <a:endCxn id="67" idx="1"/>
+          </p:cNvCxnSpPr>
+          <p:nvPr/>
+        </p:nvCxnSpPr>
+        <p:spPr>
+          <a:xfrm flipV="1">
+            <a:off x="7436818" y="1285707"/>
+            <a:ext cx="1598584" cy="909448"/>
+          </a:xfrm>
+          <a:prstGeom prst="curvedConnector3">
+            <a:avLst/>
+          </a:prstGeom>
+          <a:ln>
+            <a:tailEnd type="triangle"/>
+          </a:ln>
+        </p:spPr>
+        <p:style>
+          <a:lnRef idx="3">
+            <a:schemeClr val="accent2"/>
+          </a:lnRef>
+          <a:fillRef idx="0">
+            <a:schemeClr val="accent2"/>
+          </a:fillRef>
+          <a:effectRef idx="2">
+            <a:schemeClr val="accent2"/>
+          </a:effectRef>
+          <a:fontRef idx="minor">
+            <a:schemeClr val="tx1"/>
+          </a:fontRef>
+        </p:style>
+      </p:cxnSp>
+      <p:sp>
+        <p:nvSpPr>
+          <p:cNvPr id="72" name="CasellaDiTesto 71">
+            <a:extLst>
+              <a:ext uri="{FF2B5EF4-FFF2-40B4-BE49-F238E27FC236}">
+                <a16:creationId xmlns:a16="http://schemas.microsoft.com/office/drawing/2014/main" id="{C35B82CC-354C-6298-5775-97F026C57E07}"/>
+              </a:ext>
+            </a:extLst>
+          </p:cNvPr>
+          <p:cNvSpPr txBox="1"/>
+          <p:nvPr/>
+        </p:nvSpPr>
+        <p:spPr>
+          <a:xfrm>
+            <a:off x="4589754" y="176342"/>
+            <a:ext cx="2166153" cy="461665"/>
+          </a:xfrm>
+          <a:prstGeom prst="rect">
+            <a:avLst/>
+          </a:prstGeom>
+          <a:noFill/>
+        </p:spPr>
+        <p:txBody>
+          <a:bodyPr wrap="square" rtlCol="0">
+            <a:spAutoFit/>
+          </a:bodyPr>
+          <a:lstStyle/>
+          <a:p>
+            <a:r>
+              <a:rPr lang="it-IT" sz="2400" dirty="0"/>
+              <a:t>Data processing</a:t>
+            </a:r>
+            <a:endParaRPr lang="en-US" sz="2400" dirty="0"/>
+          </a:p>
+        </p:txBody>
+      </p:sp>
+      <p:sp>
+        <p:nvSpPr>
+          <p:cNvPr id="73" name="CasellaDiTesto 72">
+            <a:extLst>
+              <a:ext uri="{FF2B5EF4-FFF2-40B4-BE49-F238E27FC236}">
+                <a16:creationId xmlns:a16="http://schemas.microsoft.com/office/drawing/2014/main" id="{8208200B-8358-4BAC-4412-1C50091274A4}"/>
+              </a:ext>
+            </a:extLst>
+          </p:cNvPr>
+          <p:cNvSpPr txBox="1"/>
+          <p:nvPr/>
+        </p:nvSpPr>
+        <p:spPr>
+          <a:xfrm>
+            <a:off x="7666645" y="2606792"/>
+            <a:ext cx="2755739" cy="646331"/>
+          </a:xfrm>
+          <a:prstGeom prst="rect">
+            <a:avLst/>
+          </a:prstGeom>
+          <a:noFill/>
+        </p:spPr>
+        <p:txBody>
+          <a:bodyPr wrap="square" rtlCol="0">
+            <a:spAutoFit/>
+          </a:bodyPr>
+          <a:lstStyle/>
+          <a:p>
+            <a:r>
+              <a:rPr lang="it-IT" dirty="0"/>
+              <a:t>We </a:t>
+            </a:r>
             <a:r>
               <a:rPr lang="it-IT" dirty="0" err="1"/>
-              <a:t>Autoencoder</a:t>
-            </a:r>
-            <a:endParaRPr lang="it-IT" dirty="0"/>
-          </a:p>
-        </p:txBody>
-      </p:sp>
-      <p:sp>
-        <p:nvSpPr>
-          <p:cNvPr id="3" name="Segnaposto contenuto 2">
+              <a:t>stabilize</a:t>
+            </a:r>
+            <a:r>
+              <a:rPr lang="it-IT" dirty="0"/>
+              <a:t> the data and </a:t>
+            </a:r>
+            <a:r>
+              <a:rPr lang="it-IT" dirty="0" err="1"/>
+              <a:t>then</a:t>
+            </a:r>
+            <a:r>
+              <a:rPr lang="it-IT" dirty="0"/>
+              <a:t> </a:t>
+            </a:r>
+            <a:r>
+              <a:rPr lang="it-IT" dirty="0" err="1"/>
+              <a:t>apply</a:t>
+            </a:r>
+            <a:r>
+              <a:rPr lang="it-IT" dirty="0"/>
+              <a:t> z-scoring</a:t>
+            </a:r>
+            <a:endParaRPr lang="en-US" dirty="0"/>
+          </a:p>
+        </p:txBody>
+      </p:sp>
+      <p:pic>
+        <p:nvPicPr>
+          <p:cNvPr id="78" name="Immagine 77">
             <a:extLst>
               <a:ext uri="{FF2B5EF4-FFF2-40B4-BE49-F238E27FC236}">
-                <a16:creationId xmlns:a16="http://schemas.microsoft.com/office/drawing/2014/main" id="{F25DE4E4-12F8-E4B2-597B-24FF547497C9}"/>
+                <a16:creationId xmlns:a16="http://schemas.microsoft.com/office/drawing/2014/main" id="{3A0A0132-A69B-80F3-2C26-6D809107366C}"/>
               </a:ext>
             </a:extLst>
           </p:cNvPr>
-          <p:cNvSpPr>
-            <a:spLocks noGrp="1"/>
-          </p:cNvSpPr>
-          <p:nvPr>
-            <p:ph idx="1"/>
-          </p:nvPr>
-        </p:nvSpPr>
-        <p:spPr/>
-        <p:txBody>
-          <a:bodyPr/>
+          <p:cNvPicPr>
+            <a:picLocks noChangeAspect="1"/>
+          </p:cNvPicPr>
+          <p:nvPr/>
+        </p:nvPicPr>
+        <p:blipFill>
+          <a:blip r:embed="rId5">
+            <a:extLst>
+              <a:ext uri="{28A0092B-C50C-407E-A947-70E740481C1C}">
+                <a14:useLocalDpi xmlns:a14="http://schemas.microsoft.com/office/drawing/2010/main" val="0"/>
+              </a:ext>
+            </a:extLst>
+          </a:blip>
+          <a:srcRect/>
+          <a:stretch/>
+        </p:blipFill>
+        <p:spPr>
+          <a:xfrm>
+            <a:off x="4372284" y="3491787"/>
+            <a:ext cx="3038855" cy="2342116"/>
+          </a:xfrm>
+          <a:prstGeom prst="rect">
+            <a:avLst/>
+          </a:prstGeom>
+        </p:spPr>
+      </p:pic>
+      <p:pic>
+        <p:nvPicPr>
+          <p:cNvPr id="79" name="Immagine 78">
+            <a:extLst>
+              <a:ext uri="{FF2B5EF4-FFF2-40B4-BE49-F238E27FC236}">
+                <a16:creationId xmlns:a16="http://schemas.microsoft.com/office/drawing/2014/main" id="{3F8CC613-0E9E-95F5-E770-40305408B1D4}"/>
+              </a:ext>
+            </a:extLst>
+          </p:cNvPr>
+          <p:cNvPicPr>
+            <a:picLocks noChangeAspect="1"/>
+          </p:cNvPicPr>
+          <p:nvPr/>
+        </p:nvPicPr>
+        <p:blipFill>
+          <a:blip r:embed="rId6">
+            <a:extLst>
+              <a:ext uri="{28A0092B-C50C-407E-A947-70E740481C1C}">
+                <a14:useLocalDpi xmlns:a14="http://schemas.microsoft.com/office/drawing/2010/main" val="0"/>
+              </a:ext>
+            </a:extLst>
+          </a:blip>
+          <a:srcRect/>
+          <a:stretch/>
+        </p:blipFill>
+        <p:spPr>
+          <a:xfrm>
+            <a:off x="9146868" y="4405976"/>
+            <a:ext cx="2918636" cy="2342116"/>
+          </a:xfrm>
+          <a:prstGeom prst="rect">
+            <a:avLst/>
+          </a:prstGeom>
+        </p:spPr>
+      </p:pic>
+      <p:sp>
+        <p:nvSpPr>
+          <p:cNvPr id="80" name="CasellaDiTesto 79">
+            <a:extLst>
+              <a:ext uri="{FF2B5EF4-FFF2-40B4-BE49-F238E27FC236}">
+                <a16:creationId xmlns:a16="http://schemas.microsoft.com/office/drawing/2014/main" id="{A606782E-F70C-F09A-791D-D5578EE6BE4D}"/>
+              </a:ext>
+            </a:extLst>
+          </p:cNvPr>
+          <p:cNvSpPr txBox="1"/>
+          <p:nvPr/>
+        </p:nvSpPr>
+        <p:spPr>
+          <a:xfrm>
+            <a:off x="4589754" y="6107836"/>
+            <a:ext cx="2918636" cy="461665"/>
+          </a:xfrm>
+          <a:prstGeom prst="rect">
+            <a:avLst/>
+          </a:prstGeom>
+          <a:noFill/>
+        </p:spPr>
+        <p:txBody>
+          <a:bodyPr wrap="square" rtlCol="0">
+            <a:spAutoFit/>
+          </a:bodyPr>
+          <a:lstStyle/>
+          <a:p>
+            <a:r>
+              <a:rPr lang="it-IT" sz="2400" dirty="0"/>
+              <a:t>Best Learning rate</a:t>
+            </a:r>
+            <a:endParaRPr lang="en-US" sz="2400" dirty="0"/>
+          </a:p>
+        </p:txBody>
+      </p:sp>
+      <p:sp>
+        <p:nvSpPr>
+          <p:cNvPr id="81" name="Fascicolazione 80">
+            <a:extLst>
+              <a:ext uri="{FF2B5EF4-FFF2-40B4-BE49-F238E27FC236}">
+                <a16:creationId xmlns:a16="http://schemas.microsoft.com/office/drawing/2014/main" id="{509FDD7E-1C71-9D13-E6BF-3E21FD476055}"/>
+              </a:ext>
+            </a:extLst>
+          </p:cNvPr>
+          <p:cNvSpPr/>
+          <p:nvPr/>
+        </p:nvSpPr>
+        <p:spPr>
+          <a:xfrm rot="16200000">
+            <a:off x="7810258" y="4422345"/>
+            <a:ext cx="923277" cy="1527012"/>
+          </a:xfrm>
+          <a:prstGeom prst="flowChartCollate">
+            <a:avLst/>
+          </a:prstGeom>
+        </p:spPr>
+        <p:style>
+          <a:lnRef idx="2">
+            <a:schemeClr val="accent1">
+              <a:shade val="50000"/>
+            </a:schemeClr>
+          </a:lnRef>
+          <a:fillRef idx="1">
+            <a:schemeClr val="accent1"/>
+          </a:fillRef>
+          <a:effectRef idx="0">
+            <a:schemeClr val="accent1"/>
+          </a:effectRef>
+          <a:fontRef idx="minor">
+            <a:schemeClr val="lt1"/>
+          </a:fontRef>
+        </p:style>
+        <p:txBody>
+          <a:bodyPr rtlCol="0" anchor="ctr"/>
+          <a:lstStyle/>
+          <a:p>
+            <a:pPr algn="ctr"/>
+            <a:endParaRPr lang="en-US">
+              <a:solidFill>
+                <a:schemeClr val="tx1"/>
+              </a:solidFill>
+            </a:endParaRPr>
+          </a:p>
+        </p:txBody>
+      </p:sp>
+      <p:sp>
+        <p:nvSpPr>
+          <p:cNvPr id="82" name="CasellaDiTesto 81">
+            <a:extLst>
+              <a:ext uri="{FF2B5EF4-FFF2-40B4-BE49-F238E27FC236}">
+                <a16:creationId xmlns:a16="http://schemas.microsoft.com/office/drawing/2014/main" id="{D83C482D-DA5F-2BCE-A617-277D1D04AF53}"/>
+              </a:ext>
+            </a:extLst>
+          </p:cNvPr>
+          <p:cNvSpPr txBox="1"/>
+          <p:nvPr/>
+        </p:nvSpPr>
+        <p:spPr>
+          <a:xfrm>
+            <a:off x="7517117" y="3476441"/>
+            <a:ext cx="4206181" cy="923330"/>
+          </a:xfrm>
+          <a:prstGeom prst="rect">
+            <a:avLst/>
+          </a:prstGeom>
+          <a:noFill/>
+        </p:spPr>
+        <p:txBody>
+          <a:bodyPr wrap="square" rtlCol="0">
+            <a:spAutoFit/>
+          </a:bodyPr>
           <a:lstStyle/>
           <a:p>
             <a:r>
               <a:rPr lang="it-IT" dirty="0"/>
-              <a:t>Jacopo spiega in un paio di slides e fornisci grafici utili</a:t>
+              <a:t>We </a:t>
+            </a:r>
+            <a:r>
+              <a:rPr lang="it-IT" dirty="0" err="1"/>
+              <a:t>tested</a:t>
+            </a:r>
+            <a:r>
+              <a:rPr lang="it-IT" dirty="0"/>
+              <a:t> 100 LR</a:t>
+            </a:r>
+            <a:r>
+              <a:rPr lang="en-US" dirty="0"/>
+              <a:t>’s and select the one with the lowest validation loss</a:t>
+            </a:r>
+          </a:p>
+          <a:p>
+            <a:r>
+              <a:rPr lang="en-US" dirty="0"/>
+              <a:t>Best learning rate: 0.0012</a:t>
             </a:r>
           </a:p>
         </p:txBody>
@@ -3608,6 +3905,603 @@
 </file>
 
 <file path=ppt/slides/slide12.xml><?xml version="1.0" encoding="utf-8"?>
+<p:sld xmlns:a="http://schemas.openxmlformats.org/drawingml/2006/main" xmlns:r="http://schemas.openxmlformats.org/officeDocument/2006/relationships" xmlns:p="http://schemas.openxmlformats.org/presentationml/2006/main">
+  <p:cSld>
+    <p:bg>
+      <p:bgPr>
+        <a:solidFill>
+          <a:schemeClr val="bg1"/>
+        </a:solidFill>
+        <a:effectLst/>
+      </p:bgPr>
+    </p:bg>
+    <p:spTree>
+      <p:nvGrpSpPr>
+        <p:cNvPr id="1" name=""/>
+        <p:cNvGrpSpPr/>
+        <p:nvPr/>
+      </p:nvGrpSpPr>
+      <p:grpSpPr>
+        <a:xfrm>
+          <a:off x="0" y="0"/>
+          <a:ext cx="0" cy="0"/>
+          <a:chOff x="0" y="0"/>
+          <a:chExt cx="0" cy="0"/>
+        </a:xfrm>
+      </p:grpSpPr>
+      <p:sp>
+        <p:nvSpPr>
+          <p:cNvPr id="2" name="Titolo 1">
+            <a:extLst>
+              <a:ext uri="{FF2B5EF4-FFF2-40B4-BE49-F238E27FC236}">
+                <a16:creationId xmlns:a16="http://schemas.microsoft.com/office/drawing/2014/main" id="{7610D10B-29F2-CDE5-607B-085C33629175}"/>
+              </a:ext>
+            </a:extLst>
+          </p:cNvPr>
+          <p:cNvSpPr>
+            <a:spLocks noGrp="1"/>
+          </p:cNvSpPr>
+          <p:nvPr>
+            <p:ph type="title"/>
+          </p:nvPr>
+        </p:nvSpPr>
+        <p:spPr>
+          <a:xfrm>
+            <a:off x="4712591" y="5145946"/>
+            <a:ext cx="1483743" cy="624010"/>
+          </a:xfrm>
+          <a:noFill/>
+        </p:spPr>
+        <p:txBody>
+          <a:bodyPr vert="horz" lIns="91440" tIns="45720" rIns="91440" bIns="45720" rtlCol="0" anchor="ctr">
+            <a:normAutofit/>
+          </a:bodyPr>
+          <a:lstStyle/>
+          <a:p>
+            <a:pPr algn="ctr"/>
+            <a:endParaRPr lang="en-US" sz="3600" kern="1200" dirty="0">
+              <a:solidFill>
+                <a:srgbClr val="FFFFFF"/>
+              </a:solidFill>
+              <a:latin typeface="+mj-lt"/>
+              <a:ea typeface="+mj-ea"/>
+              <a:cs typeface="+mj-cs"/>
+            </a:endParaRPr>
+          </a:p>
+        </p:txBody>
+      </p:sp>
+      <p:sp>
+        <p:nvSpPr>
+          <p:cNvPr id="50" name="Freccia a pentagono 49">
+            <a:extLst>
+              <a:ext uri="{FF2B5EF4-FFF2-40B4-BE49-F238E27FC236}">
+                <a16:creationId xmlns:a16="http://schemas.microsoft.com/office/drawing/2014/main" id="{242B7F2F-CD65-9BFE-6CA3-0527428DE06E}"/>
+              </a:ext>
+            </a:extLst>
+          </p:cNvPr>
+          <p:cNvSpPr/>
+          <p:nvPr/>
+        </p:nvSpPr>
+        <p:spPr>
+          <a:xfrm>
+            <a:off x="412060" y="52177"/>
+            <a:ext cx="3121253" cy="1915089"/>
+          </a:xfrm>
+          <a:prstGeom prst="homePlate">
+            <a:avLst/>
+          </a:prstGeom>
+          <a:solidFill>
+            <a:schemeClr val="accent3"/>
+          </a:solidFill>
+        </p:spPr>
+        <p:style>
+          <a:lnRef idx="2">
+            <a:schemeClr val="accent3">
+              <a:shade val="50000"/>
+            </a:schemeClr>
+          </a:lnRef>
+          <a:fillRef idx="1">
+            <a:schemeClr val="accent3"/>
+          </a:fillRef>
+          <a:effectRef idx="0">
+            <a:schemeClr val="accent3"/>
+          </a:effectRef>
+          <a:fontRef idx="minor">
+            <a:schemeClr val="lt1"/>
+          </a:fontRef>
+        </p:style>
+        <p:txBody>
+          <a:bodyPr rtlCol="0" anchor="ctr"/>
+          <a:lstStyle/>
+          <a:p>
+            <a:pPr algn="ctr"/>
+            <a:endParaRPr lang="en-US" dirty="0"/>
+          </a:p>
+        </p:txBody>
+      </p:sp>
+      <p:sp>
+        <p:nvSpPr>
+          <p:cNvPr id="29" name="Rettangolo 28">
+            <a:extLst>
+              <a:ext uri="{FF2B5EF4-FFF2-40B4-BE49-F238E27FC236}">
+                <a16:creationId xmlns:a16="http://schemas.microsoft.com/office/drawing/2014/main" id="{E2FFAD3C-07E3-58C6-AAE5-FFEBEA7E115F}"/>
+              </a:ext>
+            </a:extLst>
+          </p:cNvPr>
+          <p:cNvSpPr/>
+          <p:nvPr/>
+        </p:nvSpPr>
+        <p:spPr>
+          <a:xfrm>
+            <a:off x="4275184" y="0"/>
+            <a:ext cx="7916816" cy="3429000"/>
+          </a:xfrm>
+          <a:prstGeom prst="rect">
+            <a:avLst/>
+          </a:prstGeom>
+          <a:solidFill>
+            <a:schemeClr val="accent6"/>
+          </a:solidFill>
+        </p:spPr>
+        <p:style>
+          <a:lnRef idx="2">
+            <a:schemeClr val="accent1">
+              <a:shade val="50000"/>
+            </a:schemeClr>
+          </a:lnRef>
+          <a:fillRef idx="1">
+            <a:schemeClr val="accent1"/>
+          </a:fillRef>
+          <a:effectRef idx="0">
+            <a:schemeClr val="accent1"/>
+          </a:effectRef>
+          <a:fontRef idx="minor">
+            <a:schemeClr val="lt1"/>
+          </a:fontRef>
+        </p:style>
+        <p:txBody>
+          <a:bodyPr rtlCol="0" anchor="ctr"/>
+          <a:lstStyle/>
+          <a:p>
+            <a:pPr algn="ctr"/>
+            <a:endParaRPr lang="en-US" dirty="0">
+              <a:ln w="0"/>
+              <a:solidFill>
+                <a:schemeClr val="tx1"/>
+              </a:solidFill>
+              <a:effectLst>
+                <a:outerShdw blurRad="38100" dist="19050" dir="2700000" algn="tl" rotWithShape="0">
+                  <a:schemeClr val="dk1">
+                    <a:alpha val="40000"/>
+                  </a:schemeClr>
+                </a:outerShdw>
+              </a:effectLst>
+            </a:endParaRPr>
+          </a:p>
+        </p:txBody>
+      </p:sp>
+      <p:sp>
+        <p:nvSpPr>
+          <p:cNvPr id="51" name="CasellaDiTesto 50">
+            <a:extLst>
+              <a:ext uri="{FF2B5EF4-FFF2-40B4-BE49-F238E27FC236}">
+                <a16:creationId xmlns:a16="http://schemas.microsoft.com/office/drawing/2014/main" id="{2F1B6880-124C-F0B4-6214-08CC90BDB112}"/>
+              </a:ext>
+            </a:extLst>
+          </p:cNvPr>
+          <p:cNvSpPr txBox="1"/>
+          <p:nvPr/>
+        </p:nvSpPr>
+        <p:spPr>
+          <a:xfrm>
+            <a:off x="638469" y="516740"/>
+            <a:ext cx="2091609" cy="954107"/>
+          </a:xfrm>
+          <a:prstGeom prst="rect">
+            <a:avLst/>
+          </a:prstGeom>
+          <a:noFill/>
+        </p:spPr>
+        <p:txBody>
+          <a:bodyPr wrap="square" rtlCol="0">
+            <a:spAutoFit/>
+          </a:bodyPr>
+          <a:lstStyle/>
+          <a:p>
+            <a:r>
+              <a:rPr lang="en-US" sz="2800" dirty="0"/>
+              <a:t>Model evaluation</a:t>
+            </a:r>
+          </a:p>
+        </p:txBody>
+      </p:sp>
+      <p:sp>
+        <p:nvSpPr>
+          <p:cNvPr id="31" name="Rettangolo 30">
+            <a:extLst>
+              <a:ext uri="{FF2B5EF4-FFF2-40B4-BE49-F238E27FC236}">
+                <a16:creationId xmlns:a16="http://schemas.microsoft.com/office/drawing/2014/main" id="{37B9362A-CD26-7C04-A44C-7748284AB883}"/>
+              </a:ext>
+            </a:extLst>
+          </p:cNvPr>
+          <p:cNvSpPr/>
+          <p:nvPr/>
+        </p:nvSpPr>
+        <p:spPr>
+          <a:xfrm>
+            <a:off x="4266306" y="3429000"/>
+            <a:ext cx="7930857" cy="3429001"/>
+          </a:xfrm>
+          <a:prstGeom prst="rect">
+            <a:avLst/>
+          </a:prstGeom>
+          <a:solidFill>
+            <a:srgbClr val="FFC000"/>
+          </a:solidFill>
+        </p:spPr>
+        <p:style>
+          <a:lnRef idx="2">
+            <a:schemeClr val="accent2">
+              <a:shade val="50000"/>
+            </a:schemeClr>
+          </a:lnRef>
+          <a:fillRef idx="1">
+            <a:schemeClr val="accent2"/>
+          </a:fillRef>
+          <a:effectRef idx="0">
+            <a:schemeClr val="accent2"/>
+          </a:effectRef>
+          <a:fontRef idx="minor">
+            <a:schemeClr val="lt1"/>
+          </a:fontRef>
+        </p:style>
+        <p:txBody>
+          <a:bodyPr rtlCol="0" anchor="ctr"/>
+          <a:lstStyle/>
+          <a:p>
+            <a:pPr algn="ctr"/>
+            <a:endParaRPr lang="en-US"/>
+          </a:p>
+        </p:txBody>
+      </p:sp>
+      <p:sp>
+        <p:nvSpPr>
+          <p:cNvPr id="72" name="CasellaDiTesto 71">
+            <a:extLst>
+              <a:ext uri="{FF2B5EF4-FFF2-40B4-BE49-F238E27FC236}">
+                <a16:creationId xmlns:a16="http://schemas.microsoft.com/office/drawing/2014/main" id="{C35B82CC-354C-6298-5775-97F026C57E07}"/>
+              </a:ext>
+            </a:extLst>
+          </p:cNvPr>
+          <p:cNvSpPr txBox="1"/>
+          <p:nvPr/>
+        </p:nvSpPr>
+        <p:spPr>
+          <a:xfrm>
+            <a:off x="4372284" y="-5090"/>
+            <a:ext cx="4552703" cy="1046440"/>
+          </a:xfrm>
+          <a:prstGeom prst="rect">
+            <a:avLst/>
+          </a:prstGeom>
+          <a:noFill/>
+        </p:spPr>
+        <p:txBody>
+          <a:bodyPr wrap="square" rtlCol="0">
+            <a:spAutoFit/>
+          </a:bodyPr>
+          <a:lstStyle/>
+          <a:p>
+            <a:r>
+              <a:rPr lang="it-IT" sz="2400" dirty="0"/>
+              <a:t>Best threshold</a:t>
+            </a:r>
+            <a:endParaRPr lang="en-US" sz="2400" dirty="0"/>
+          </a:p>
+          <a:p>
+            <a:r>
+              <a:rPr lang="en-US" sz="1400" dirty="0"/>
+              <a:t>We select the best threshold based on the F1 score</a:t>
+            </a:r>
+          </a:p>
+          <a:p>
+            <a:endParaRPr lang="en-US" sz="2400" dirty="0"/>
+          </a:p>
+        </p:txBody>
+      </p:sp>
+      <p:sp>
+        <p:nvSpPr>
+          <p:cNvPr id="80" name="CasellaDiTesto 79">
+            <a:extLst>
+              <a:ext uri="{FF2B5EF4-FFF2-40B4-BE49-F238E27FC236}">
+                <a16:creationId xmlns:a16="http://schemas.microsoft.com/office/drawing/2014/main" id="{A606782E-F70C-F09A-791D-D5578EE6BE4D}"/>
+              </a:ext>
+            </a:extLst>
+          </p:cNvPr>
+          <p:cNvSpPr txBox="1"/>
+          <p:nvPr/>
+        </p:nvSpPr>
+        <p:spPr>
+          <a:xfrm>
+            <a:off x="4372284" y="3524369"/>
+            <a:ext cx="1096863" cy="461665"/>
+          </a:xfrm>
+          <a:prstGeom prst="rect">
+            <a:avLst/>
+          </a:prstGeom>
+          <a:noFill/>
+        </p:spPr>
+        <p:txBody>
+          <a:bodyPr wrap="square" rtlCol="0">
+            <a:spAutoFit/>
+          </a:bodyPr>
+          <a:lstStyle/>
+          <a:p>
+            <a:r>
+              <a:rPr lang="it-IT" sz="2400" dirty="0"/>
+              <a:t>Results</a:t>
+            </a:r>
+            <a:endParaRPr lang="en-US" sz="2400" dirty="0"/>
+          </a:p>
+        </p:txBody>
+      </p:sp>
+      <p:pic>
+        <p:nvPicPr>
+          <p:cNvPr id="6" name="Immagine 5">
+            <a:extLst>
+              <a:ext uri="{FF2B5EF4-FFF2-40B4-BE49-F238E27FC236}">
+                <a16:creationId xmlns:a16="http://schemas.microsoft.com/office/drawing/2014/main" id="{5D87361C-A100-7C16-D127-F6262057B72B}"/>
+              </a:ext>
+            </a:extLst>
+          </p:cNvPr>
+          <p:cNvPicPr>
+            <a:picLocks noChangeAspect="1"/>
+          </p:cNvPicPr>
+          <p:nvPr/>
+        </p:nvPicPr>
+        <p:blipFill>
+          <a:blip r:embed="rId2">
+            <a:extLst>
+              <a:ext uri="{28A0092B-C50C-407E-A947-70E740481C1C}">
+                <a14:useLocalDpi xmlns:a14="http://schemas.microsoft.com/office/drawing/2010/main" val="0"/>
+              </a:ext>
+            </a:extLst>
+          </a:blip>
+          <a:srcRect/>
+          <a:stretch/>
+        </p:blipFill>
+        <p:spPr>
+          <a:xfrm>
+            <a:off x="4378035" y="728301"/>
+            <a:ext cx="3038855" cy="2307180"/>
+          </a:xfrm>
+          <a:prstGeom prst="rect">
+            <a:avLst/>
+          </a:prstGeom>
+        </p:spPr>
+      </p:pic>
+      <p:pic>
+        <p:nvPicPr>
+          <p:cNvPr id="7" name="Immagine 6">
+            <a:extLst>
+              <a:ext uri="{FF2B5EF4-FFF2-40B4-BE49-F238E27FC236}">
+                <a16:creationId xmlns:a16="http://schemas.microsoft.com/office/drawing/2014/main" id="{6CF9448C-0E78-5161-A340-9E30B243E6DE}"/>
+              </a:ext>
+            </a:extLst>
+          </p:cNvPr>
+          <p:cNvPicPr>
+            <a:picLocks noChangeAspect="1"/>
+          </p:cNvPicPr>
+          <p:nvPr/>
+        </p:nvPicPr>
+        <p:blipFill>
+          <a:blip r:embed="rId3">
+            <a:extLst>
+              <a:ext uri="{28A0092B-C50C-407E-A947-70E740481C1C}">
+                <a14:useLocalDpi xmlns:a14="http://schemas.microsoft.com/office/drawing/2010/main" val="0"/>
+              </a:ext>
+            </a:extLst>
+          </a:blip>
+          <a:srcRect/>
+          <a:stretch/>
+        </p:blipFill>
+        <p:spPr>
+          <a:xfrm>
+            <a:off x="7572672" y="724011"/>
+            <a:ext cx="3028173" cy="2307180"/>
+          </a:xfrm>
+          <a:prstGeom prst="rect">
+            <a:avLst/>
+          </a:prstGeom>
+        </p:spPr>
+      </p:pic>
+      <p:sp>
+        <p:nvSpPr>
+          <p:cNvPr id="10" name="CasellaDiTesto 9">
+            <a:extLst>
+              <a:ext uri="{FF2B5EF4-FFF2-40B4-BE49-F238E27FC236}">
+                <a16:creationId xmlns:a16="http://schemas.microsoft.com/office/drawing/2014/main" id="{241803F5-A2A5-8C48-911E-1DA6448AD859}"/>
+              </a:ext>
+            </a:extLst>
+          </p:cNvPr>
+          <p:cNvSpPr txBox="1"/>
+          <p:nvPr/>
+        </p:nvSpPr>
+        <p:spPr>
+          <a:xfrm>
+            <a:off x="10672309" y="1222615"/>
+            <a:ext cx="1448226" cy="1077218"/>
+          </a:xfrm>
+          <a:prstGeom prst="rect">
+            <a:avLst/>
+          </a:prstGeom>
+          <a:noFill/>
+        </p:spPr>
+        <p:txBody>
+          <a:bodyPr wrap="square" rtlCol="0">
+            <a:spAutoFit/>
+          </a:bodyPr>
+          <a:lstStyle/>
+          <a:p>
+            <a:r>
+              <a:rPr lang="en-US" sz="1600" dirty="0"/>
+              <a:t>AUC score:</a:t>
+            </a:r>
+          </a:p>
+          <a:p>
+            <a:r>
+              <a:rPr lang="en-US" sz="1600" dirty="0"/>
+              <a:t>0.743</a:t>
+            </a:r>
+          </a:p>
+          <a:p>
+            <a:r>
+              <a:rPr lang="en-US" sz="1600" dirty="0"/>
+              <a:t>Best threshold:</a:t>
+            </a:r>
+          </a:p>
+          <a:p>
+            <a:r>
+              <a:rPr lang="en-US" sz="1600" dirty="0"/>
+              <a:t>0.1846</a:t>
+            </a:r>
+          </a:p>
+        </p:txBody>
+      </p:sp>
+      <p:pic>
+        <p:nvPicPr>
+          <p:cNvPr id="14" name="Immagine 13">
+            <a:extLst>
+              <a:ext uri="{FF2B5EF4-FFF2-40B4-BE49-F238E27FC236}">
+                <a16:creationId xmlns:a16="http://schemas.microsoft.com/office/drawing/2014/main" id="{DDDB3919-9A3E-17B1-21D3-D15EB78EFF95}"/>
+              </a:ext>
+            </a:extLst>
+          </p:cNvPr>
+          <p:cNvPicPr>
+            <a:picLocks noChangeAspect="1"/>
+          </p:cNvPicPr>
+          <p:nvPr/>
+        </p:nvPicPr>
+        <p:blipFill>
+          <a:blip r:embed="rId4"/>
+          <a:stretch>
+            <a:fillRect/>
+          </a:stretch>
+        </p:blipFill>
+        <p:spPr>
+          <a:xfrm>
+            <a:off x="8840068" y="3575063"/>
+            <a:ext cx="3121253" cy="3221579"/>
+          </a:xfrm>
+          <a:prstGeom prst="rect">
+            <a:avLst/>
+          </a:prstGeom>
+        </p:spPr>
+      </p:pic>
+      <p:sp>
+        <p:nvSpPr>
+          <p:cNvPr id="15" name="CasellaDiTesto 14">
+            <a:extLst>
+              <a:ext uri="{FF2B5EF4-FFF2-40B4-BE49-F238E27FC236}">
+                <a16:creationId xmlns:a16="http://schemas.microsoft.com/office/drawing/2014/main" id="{928763AE-5F53-6A62-CC71-C010AE82127E}"/>
+              </a:ext>
+            </a:extLst>
+          </p:cNvPr>
+          <p:cNvSpPr txBox="1"/>
+          <p:nvPr/>
+        </p:nvSpPr>
+        <p:spPr>
+          <a:xfrm>
+            <a:off x="77990" y="2296413"/>
+            <a:ext cx="3672719" cy="1754326"/>
+          </a:xfrm>
+          <a:prstGeom prst="rect">
+            <a:avLst/>
+          </a:prstGeom>
+          <a:noFill/>
+        </p:spPr>
+        <p:txBody>
+          <a:bodyPr wrap="square" rtlCol="0">
+            <a:spAutoFit/>
+          </a:bodyPr>
+          <a:lstStyle/>
+          <a:p>
+            <a:r>
+              <a:rPr lang="en-US" dirty="0"/>
+              <a:t>We obtain the following results:</a:t>
+            </a:r>
+          </a:p>
+          <a:p>
+            <a:pPr marL="285750" indent="-285750">
+              <a:buFont typeface="Arial" panose="020B0604020202020204" pitchFamily="34" charset="0"/>
+              <a:buChar char="•"/>
+            </a:pPr>
+            <a:r>
+              <a:rPr lang="en-US" dirty="0"/>
+              <a:t>Recall 0.97: we are correctly identifying almost all the anomalies</a:t>
+            </a:r>
+          </a:p>
+          <a:p>
+            <a:pPr marL="285750" indent="-285750">
+              <a:buFont typeface="Arial" panose="020B0604020202020204" pitchFamily="34" charset="0"/>
+              <a:buChar char="•"/>
+            </a:pPr>
+            <a:r>
+              <a:rPr lang="en-US" dirty="0"/>
+              <a:t>Precision 0.63: we are misidentifying many normal days</a:t>
+            </a:r>
+          </a:p>
+        </p:txBody>
+      </p:sp>
+      <p:pic>
+        <p:nvPicPr>
+          <p:cNvPr id="16" name="Immagine 15">
+            <a:extLst>
+              <a:ext uri="{FF2B5EF4-FFF2-40B4-BE49-F238E27FC236}">
+                <a16:creationId xmlns:a16="http://schemas.microsoft.com/office/drawing/2014/main" id="{E062C997-6211-1498-AA3F-3EB522E6374B}"/>
+              </a:ext>
+            </a:extLst>
+          </p:cNvPr>
+          <p:cNvPicPr>
+            <a:picLocks noChangeAspect="1"/>
+          </p:cNvPicPr>
+          <p:nvPr/>
+        </p:nvPicPr>
+        <p:blipFill>
+          <a:blip r:embed="rId5">
+            <a:extLst>
+              <a:ext uri="{28A0092B-C50C-407E-A947-70E740481C1C}">
+                <a14:useLocalDpi xmlns:a14="http://schemas.microsoft.com/office/drawing/2010/main" val="0"/>
+              </a:ext>
+            </a:extLst>
+          </a:blip>
+          <a:srcRect/>
+          <a:stretch/>
+        </p:blipFill>
+        <p:spPr>
+          <a:xfrm>
+            <a:off x="5542580" y="3575063"/>
+            <a:ext cx="3121253" cy="3221579"/>
+          </a:xfrm>
+          <a:prstGeom prst="rect">
+            <a:avLst/>
+          </a:prstGeom>
+        </p:spPr>
+      </p:pic>
+    </p:spTree>
+    <p:extLst>
+      <p:ext uri="{BB962C8B-B14F-4D97-AF65-F5344CB8AC3E}">
+        <p14:creationId xmlns:p14="http://schemas.microsoft.com/office/powerpoint/2010/main" val="3368148799"/>
+      </p:ext>
+    </p:extLst>
+  </p:cSld>
+  <p:clrMapOvr>
+    <a:masterClrMapping/>
+  </p:clrMapOvr>
+</p:sld>
+</file>
+
+<file path=ppt/slides/slide13.xml><?xml version="1.0" encoding="utf-8"?>
 <p:sld xmlns:a="http://schemas.openxmlformats.org/drawingml/2006/main" xmlns:r="http://schemas.openxmlformats.org/officeDocument/2006/relationships" xmlns:p="http://schemas.openxmlformats.org/presentationml/2006/main">
   <p:cSld>
     <p:spTree>
@@ -4092,15 +4986,7 @@
           <a:p>
             <a:r>
               <a:rPr lang="it-IT" dirty="0"/>
-              <a:t>Strada alternativa: </a:t>
-            </a:r>
-            <a:r>
-              <a:rPr lang="it-IT" dirty="0" err="1"/>
-              <a:t>Autoencoder</a:t>
-            </a:r>
-            <a:r>
-              <a:rPr lang="it-IT" dirty="0"/>
-              <a:t> con ANN (Jacopo dimmi tu come inserirlo)</a:t>
+              <a:t>Strada alternativa: Autoencoder con ANN (Jacopo dimmi tu come inserirlo)</a:t>
             </a:r>
           </a:p>
           <a:p>
@@ -4589,7 +5475,7 @@
 <file path=ppt/theme/theme1.xml><?xml version="1.0" encoding="utf-8"?>
 <a:theme xmlns:a="http://schemas.openxmlformats.org/drawingml/2006/main" name="Tema di Office">
   <a:themeElements>
-    <a:clrScheme name="Office">
+    <a:clrScheme name="Tema di Office">
       <a:dk1>
         <a:sysClr val="windowText" lastClr="000000"/>
       </a:dk1>
@@ -4627,7 +5513,7 @@
         <a:srgbClr val="954F72"/>
       </a:folHlink>
     </a:clrScheme>
-    <a:fontScheme name="Office">
+    <a:fontScheme name="Tema di Office">
       <a:majorFont>
         <a:latin typeface="Calibri Light" panose="020F0302020204030204"/>
         <a:ea typeface=""/>
@@ -4662,23 +5548,6 @@
         <a:font script="Viet" typeface="Times New Roman"/>
         <a:font script="Uigh" typeface="Microsoft Uighur"/>
         <a:font script="Geor" typeface="Sylfaen"/>
-        <a:font script="Armn" typeface="Arial"/>
-        <a:font script="Bugi" typeface="Leelawadee UI"/>
-        <a:font script="Bopo" typeface="Microsoft JhengHei"/>
-        <a:font script="Java" typeface="Javanese Text"/>
-        <a:font script="Lisu" typeface="Segoe UI"/>
-        <a:font script="Mymr" typeface="Myanmar Text"/>
-        <a:font script="Nkoo" typeface="Ebrima"/>
-        <a:font script="Olck" typeface="Nirmala UI"/>
-        <a:font script="Osma" typeface="Ebrima"/>
-        <a:font script="Phag" typeface="Phagspa"/>
-        <a:font script="Syrn" typeface="Estrangelo Edessa"/>
-        <a:font script="Syrj" typeface="Estrangelo Edessa"/>
-        <a:font script="Syre" typeface="Estrangelo Edessa"/>
-        <a:font script="Sora" typeface="Nirmala UI"/>
-        <a:font script="Tale" typeface="Microsoft Tai Le"/>
-        <a:font script="Talu" typeface="Microsoft New Tai Lue"/>
-        <a:font script="Tfng" typeface="Ebrima"/>
       </a:majorFont>
       <a:minorFont>
         <a:latin typeface="Calibri" panose="020F0502020204030204"/>
@@ -4714,26 +5583,9 @@
         <a:font script="Viet" typeface="Arial"/>
         <a:font script="Uigh" typeface="Microsoft Uighur"/>
         <a:font script="Geor" typeface="Sylfaen"/>
-        <a:font script="Armn" typeface="Arial"/>
-        <a:font script="Bugi" typeface="Leelawadee UI"/>
-        <a:font script="Bopo" typeface="Microsoft JhengHei"/>
-        <a:font script="Java" typeface="Javanese Text"/>
-        <a:font script="Lisu" typeface="Segoe UI"/>
-        <a:font script="Mymr" typeface="Myanmar Text"/>
-        <a:font script="Nkoo" typeface="Ebrima"/>
-        <a:font script="Olck" typeface="Nirmala UI"/>
-        <a:font script="Osma" typeface="Ebrima"/>
-        <a:font script="Phag" typeface="Phagspa"/>
-        <a:font script="Syrn" typeface="Estrangelo Edessa"/>
-        <a:font script="Syrj" typeface="Estrangelo Edessa"/>
-        <a:font script="Syre" typeface="Estrangelo Edessa"/>
-        <a:font script="Sora" typeface="Nirmala UI"/>
-        <a:font script="Tale" typeface="Microsoft Tai Le"/>
-        <a:font script="Talu" typeface="Microsoft New Tai Lue"/>
-        <a:font script="Tfng" typeface="Ebrima"/>
       </a:minorFont>
     </a:fontScheme>
-    <a:fmtScheme name="Office">
+    <a:fmtScheme name="Tema di Office">
       <a:fillStyleLst>
         <a:solidFill>
           <a:schemeClr val="phClr"/>
@@ -4875,7 +5727,7 @@
   <a:extraClrSchemeLst/>
   <a:extLst>
     <a:ext uri="{05A4C25C-085E-4340-85A3-A5531E510DB2}">
-      <thm15:themeFamily xmlns:thm15="http://schemas.microsoft.com/office/thememl/2012/main" name="Office Theme" id="{62F939B6-93AF-4DB8-9C6B-D6C7DFDC589F}" vid="{4A3C46E8-61CC-4603-A589-7422A47A8E4A}"/>
+      <thm15:themeFamily xmlns:thm15="http://schemas.microsoft.com/office/thememl/2012/main" name="Office Theme 2013 - 2022" id="{62F939B6-93AF-4DB8-9C6B-D6C7DFDC589F}" vid="{4A3C46E8-61CC-4603-A589-7422A47A8E4A}"/>
     </a:ext>
   </a:extLst>
 </a:theme>

</xml_diff>